<commit_message>
vector & matrices (1/3)
</commit_message>
<xml_diff>
--- a/TeachingNetwoks.pptx
+++ b/TeachingNetwoks.pptx
@@ -5,18 +5,19 @@
     <p:sldMasterId id="2147483648" r:id="rId1"/>
   </p:sldMasterIdLst>
   <p:notesMasterIdLst>
-    <p:notesMasterId r:id="rId11"/>
+    <p:notesMasterId r:id="rId12"/>
   </p:notesMasterIdLst>
   <p:sldIdLst>
     <p:sldId id="256" r:id="rId2"/>
     <p:sldId id="329" r:id="rId3"/>
-    <p:sldId id="320" r:id="rId4"/>
-    <p:sldId id="321" r:id="rId5"/>
-    <p:sldId id="324" r:id="rId6"/>
-    <p:sldId id="322" r:id="rId7"/>
-    <p:sldId id="331" r:id="rId8"/>
-    <p:sldId id="333" r:id="rId9"/>
-    <p:sldId id="335" r:id="rId10"/>
+    <p:sldId id="336" r:id="rId4"/>
+    <p:sldId id="320" r:id="rId5"/>
+    <p:sldId id="321" r:id="rId6"/>
+    <p:sldId id="324" r:id="rId7"/>
+    <p:sldId id="322" r:id="rId8"/>
+    <p:sldId id="331" r:id="rId9"/>
+    <p:sldId id="333" r:id="rId10"/>
+    <p:sldId id="335" r:id="rId11"/>
   </p:sldIdLst>
   <p:sldSz cx="12192000" cy="6858000"/>
   <p:notesSz cx="6858000" cy="9144000"/>
@@ -126,6 +127,7 @@
         <p14:section name="Maths" id="{EB53FB21-4207-4AAF-AB29-4B48807D277F}">
           <p14:sldIdLst>
             <p14:sldId id="329"/>
+            <p14:sldId id="336"/>
             <p14:sldId id="320"/>
             <p14:sldId id="321"/>
             <p14:sldId id="324"/>
@@ -645,7 +647,7 @@
           <a:p>
             <a:fld id="{A1F3994E-D175-4376-8600-63A26808DC17}" type="slidenum">
               <a:rPr lang="en-US" smtClean="0"/>
-              <a:t>3</a:t>
+              <a:t>4</a:t>
             </a:fld>
             <a:endParaRPr lang="en-US"/>
           </a:p>
@@ -732,7 +734,7 @@
           <a:p>
             <a:fld id="{A1F3994E-D175-4376-8600-63A26808DC17}" type="slidenum">
               <a:rPr lang="en-US" smtClean="0"/>
-              <a:t>4</a:t>
+              <a:t>5</a:t>
             </a:fld>
             <a:endParaRPr lang="en-US"/>
           </a:p>
@@ -819,7 +821,7 @@
           <a:p>
             <a:fld id="{A1F3994E-D175-4376-8600-63A26808DC17}" type="slidenum">
               <a:rPr lang="en-US" smtClean="0"/>
-              <a:t>5</a:t>
+              <a:t>6</a:t>
             </a:fld>
             <a:endParaRPr lang="en-US"/>
           </a:p>
@@ -912,7 +914,7 @@
           <a:p>
             <a:fld id="{A1F3994E-D175-4376-8600-63A26808DC17}" type="slidenum">
               <a:rPr lang="en-US" smtClean="0"/>
-              <a:t>6</a:t>
+              <a:t>7</a:t>
             </a:fld>
             <a:endParaRPr lang="en-US"/>
           </a:p>
@@ -999,7 +1001,7 @@
           <a:p>
             <a:fld id="{A1F3994E-D175-4376-8600-63A26808DC17}" type="slidenum">
               <a:rPr lang="en-US" smtClean="0"/>
-              <a:t>7</a:t>
+              <a:t>8</a:t>
             </a:fld>
             <a:endParaRPr lang="en-US"/>
           </a:p>
@@ -1083,7 +1085,7 @@
           <a:p>
             <a:fld id="{A1F3994E-D175-4376-8600-63A26808DC17}" type="slidenum">
               <a:rPr lang="en-US" smtClean="0"/>
-              <a:t>9</a:t>
+              <a:t>10</a:t>
             </a:fld>
             <a:endParaRPr lang="en-US"/>
           </a:p>
@@ -4444,6 +4446,145 @@
 </p:sld>
 </file>
 
+<file path=ppt/slides/slide10.xml><?xml version="1.0" encoding="utf-8"?>
+<p:sld xmlns:a="http://schemas.openxmlformats.org/drawingml/2006/main" xmlns:r="http://schemas.openxmlformats.org/officeDocument/2006/relationships" xmlns:p="http://schemas.openxmlformats.org/presentationml/2006/main">
+  <p:cSld>
+    <p:spTree>
+      <p:nvGrpSpPr>
+        <p:cNvPr id="1" name=""/>
+        <p:cNvGrpSpPr/>
+        <p:nvPr/>
+      </p:nvGrpSpPr>
+      <p:grpSpPr>
+        <a:xfrm>
+          <a:off x="0" y="0"/>
+          <a:ext cx="0" cy="0"/>
+          <a:chOff x="0" y="0"/>
+          <a:chExt cx="0" cy="0"/>
+        </a:xfrm>
+      </p:grpSpPr>
+      <p:sp>
+        <p:nvSpPr>
+          <p:cNvPr id="2" name="Title 1">
+            <a:extLst>
+              <a:ext uri="{FF2B5EF4-FFF2-40B4-BE49-F238E27FC236}">
+                <a16:creationId xmlns:a16="http://schemas.microsoft.com/office/drawing/2014/main" id="{432463C0-896B-E77C-2116-758273F29618}"/>
+              </a:ext>
+            </a:extLst>
+          </p:cNvPr>
+          <p:cNvSpPr>
+            <a:spLocks noGrp="1"/>
+          </p:cNvSpPr>
+          <p:nvPr>
+            <p:ph type="title"/>
+          </p:nvPr>
+        </p:nvSpPr>
+        <p:spPr/>
+        <p:txBody>
+          <a:bodyPr/>
+          <a:lstStyle/>
+          <a:p>
+            <a:r>
+              <a:rPr lang="en-US" dirty="0"/>
+              <a:t>Training steps</a:t>
+            </a:r>
+          </a:p>
+        </p:txBody>
+      </p:sp>
+      <p:sp>
+        <p:nvSpPr>
+          <p:cNvPr id="3" name="Content Placeholder 2">
+            <a:extLst>
+              <a:ext uri="{FF2B5EF4-FFF2-40B4-BE49-F238E27FC236}">
+                <a16:creationId xmlns:a16="http://schemas.microsoft.com/office/drawing/2014/main" id="{3AA2B7AF-1482-D472-560D-874EBAC1FC3D}"/>
+              </a:ext>
+            </a:extLst>
+          </p:cNvPr>
+          <p:cNvSpPr>
+            <a:spLocks noGrp="1"/>
+          </p:cNvSpPr>
+          <p:nvPr>
+            <p:ph idx="1"/>
+          </p:nvPr>
+        </p:nvSpPr>
+        <p:spPr/>
+        <p:txBody>
+          <a:bodyPr>
+            <a:normAutofit/>
+          </a:bodyPr>
+          <a:lstStyle/>
+          <a:p>
+            <a:pPr marL="514350" indent="-514350">
+              <a:buFont typeface="+mj-lt"/>
+              <a:buAutoNum type="arabicPeriod"/>
+            </a:pPr>
+            <a:endParaRPr lang="en-US" dirty="0"/>
+          </a:p>
+          <a:p>
+            <a:pPr marL="514350" indent="-514350">
+              <a:buFont typeface="+mj-lt"/>
+              <a:buAutoNum type="arabicPeriod"/>
+            </a:pPr>
+            <a:r>
+              <a:rPr lang="en-US" dirty="0"/>
+              <a:t>Create a network with random weights</a:t>
+            </a:r>
+          </a:p>
+          <a:p>
+            <a:pPr marL="514350" indent="-514350">
+              <a:buFont typeface="+mj-lt"/>
+              <a:buAutoNum type="arabicPeriod"/>
+            </a:pPr>
+            <a:r>
+              <a:rPr lang="en-US" dirty="0"/>
+              <a:t>Feed one piece of data (for which you know the desired output)</a:t>
+            </a:r>
+          </a:p>
+          <a:p>
+            <a:pPr marL="514350" indent="-514350">
+              <a:buFont typeface="+mj-lt"/>
+              <a:buAutoNum type="arabicPeriod"/>
+            </a:pPr>
+            <a:r>
+              <a:rPr lang="en-US" dirty="0"/>
+              <a:t>Calculate the error</a:t>
+            </a:r>
+          </a:p>
+          <a:p>
+            <a:pPr marL="514350" indent="-514350">
+              <a:buFont typeface="+mj-lt"/>
+              <a:buAutoNum type="arabicPeriod"/>
+            </a:pPr>
+            <a:r>
+              <a:rPr lang="en-US" dirty="0"/>
+              <a:t>Backpropagate the error to all intermediate variables</a:t>
+            </a:r>
+          </a:p>
+          <a:p>
+            <a:pPr marL="514350" indent="-514350">
+              <a:buFont typeface="+mj-lt"/>
+              <a:buAutoNum type="arabicPeriod"/>
+            </a:pPr>
+            <a:r>
+              <a:rPr lang="en-US" dirty="0"/>
+              <a:t>Update the parameters</a:t>
+            </a:r>
+          </a:p>
+        </p:txBody>
+      </p:sp>
+    </p:spTree>
+    <p:extLst>
+      <p:ext uri="{BB962C8B-B14F-4D97-AF65-F5344CB8AC3E}">
+        <p14:creationId xmlns:p14="http://schemas.microsoft.com/office/powerpoint/2010/main" val="356368320"/>
+      </p:ext>
+    </p:extLst>
+  </p:cSld>
+  <p:clrMapOvr>
+    <a:masterClrMapping/>
+  </p:clrMapOvr>
+</p:sld>
+</file>
+
 <file path=ppt/slides/slide2.xml><?xml version="1.0" encoding="utf-8"?>
 <p:sld xmlns:a="http://schemas.openxmlformats.org/drawingml/2006/main" xmlns:r="http://schemas.openxmlformats.org/officeDocument/2006/relationships" xmlns:p="http://schemas.openxmlformats.org/presentationml/2006/main">
   <p:cSld>
@@ -30598,6 +30739,2585 @@
           <p:cNvPr id="2" name="Title 1">
             <a:extLst>
               <a:ext uri="{FF2B5EF4-FFF2-40B4-BE49-F238E27FC236}">
+                <a16:creationId xmlns:a16="http://schemas.microsoft.com/office/drawing/2014/main" id="{F99BED0E-C05E-9B3F-D78A-997C9AC0F8F9}"/>
+              </a:ext>
+            </a:extLst>
+          </p:cNvPr>
+          <p:cNvSpPr>
+            <a:spLocks noGrp="1"/>
+          </p:cNvSpPr>
+          <p:nvPr>
+            <p:ph type="title"/>
+          </p:nvPr>
+        </p:nvSpPr>
+        <p:spPr/>
+        <p:txBody>
+          <a:bodyPr/>
+          <a:lstStyle/>
+          <a:p>
+            <a:r>
+              <a:rPr lang="en-US" dirty="0"/>
+              <a:t>Vectors &amp; matrices</a:t>
+            </a:r>
+          </a:p>
+        </p:txBody>
+      </p:sp>
+      <mc:AlternateContent xmlns:mc="http://schemas.openxmlformats.org/markup-compatibility/2006">
+        <mc:Choice xmlns:a14="http://schemas.microsoft.com/office/drawing/2010/main" Requires="a14">
+          <p:sp>
+            <p:nvSpPr>
+              <p:cNvPr id="3" name="TextBox 2">
+                <a:extLst>
+                  <a:ext uri="{FF2B5EF4-FFF2-40B4-BE49-F238E27FC236}">
+                    <a16:creationId xmlns:a16="http://schemas.microsoft.com/office/drawing/2014/main" id="{DB291272-E205-D45E-2ACE-4208FBAA2BDB}"/>
+                  </a:ext>
+                </a:extLst>
+              </p:cNvPr>
+              <p:cNvSpPr txBox="1"/>
+              <p:nvPr/>
+            </p:nvSpPr>
+            <p:spPr>
+              <a:xfrm>
+                <a:off x="2575252" y="1706852"/>
+                <a:ext cx="596531" cy="532966"/>
+              </a:xfrm>
+              <a:prstGeom prst="rect">
+                <a:avLst/>
+              </a:prstGeom>
+            </p:spPr>
+            <p:style>
+              <a:lnRef idx="2">
+                <a:schemeClr val="dk1"/>
+              </a:lnRef>
+              <a:fillRef idx="1">
+                <a:schemeClr val="lt1"/>
+              </a:fillRef>
+              <a:effectRef idx="0">
+                <a:schemeClr val="dk1"/>
+              </a:effectRef>
+              <a:fontRef idx="minor">
+                <a:schemeClr val="dk1"/>
+              </a:fontRef>
+            </p:style>
+            <p:txBody>
+              <a:bodyPr wrap="square" rtlCol="0">
+                <a:spAutoFit/>
+              </a:bodyPr>
+              <a:lstStyle/>
+              <a:p>
+                <a:pPr/>
+                <a14:m>
+                  <m:oMathPara xmlns:m="http://schemas.openxmlformats.org/officeDocument/2006/math">
+                    <m:oMathParaPr>
+                      <m:jc m:val="centerGroup"/>
+                    </m:oMathParaPr>
+                    <m:oMath xmlns:m="http://schemas.openxmlformats.org/officeDocument/2006/math">
+                      <m:sSup>
+                        <m:sSupPr>
+                          <m:ctrlPr>
+                            <a:rPr lang="en-US" sz="2800" b="1" i="1" smtClean="0">
+                              <a:latin typeface="Cambria Math" panose="02040503050406030204" pitchFamily="18" charset="0"/>
+                            </a:rPr>
+                          </m:ctrlPr>
+                        </m:sSupPr>
+                        <m:e>
+                          <m:r>
+                            <a:rPr lang="en-US" sz="2800" b="1" i="1" smtClean="0">
+                              <a:latin typeface="Cambria Math" panose="02040503050406030204" pitchFamily="18" charset="0"/>
+                            </a:rPr>
+                            <m:t>𝒍</m:t>
+                          </m:r>
+                        </m:e>
+                        <m:sup>
+                          <m:r>
+                            <a:rPr lang="en-US" sz="2800" b="1" i="1" smtClean="0">
+                              <a:latin typeface="Cambria Math" panose="02040503050406030204" pitchFamily="18" charset="0"/>
+                            </a:rPr>
+                            <m:t>𝟏</m:t>
+                          </m:r>
+                        </m:sup>
+                      </m:sSup>
+                    </m:oMath>
+                  </m:oMathPara>
+                </a14:m>
+                <a:endParaRPr lang="en-US" sz="2800" b="1" dirty="0"/>
+              </a:p>
+            </p:txBody>
+          </p:sp>
+        </mc:Choice>
+        <mc:Fallback>
+          <p:sp>
+            <p:nvSpPr>
+              <p:cNvPr id="3" name="TextBox 2">
+                <a:extLst>
+                  <a:ext uri="{FF2B5EF4-FFF2-40B4-BE49-F238E27FC236}">
+                    <a16:creationId xmlns:a16="http://schemas.microsoft.com/office/drawing/2014/main" id="{DB291272-E205-D45E-2ACE-4208FBAA2BDB}"/>
+                  </a:ext>
+                </a:extLst>
+              </p:cNvPr>
+              <p:cNvSpPr txBox="1">
+                <a:spLocks noRot="1" noChangeAspect="1" noMove="1" noResize="1" noEditPoints="1" noAdjustHandles="1" noChangeArrowheads="1" noChangeShapeType="1" noTextEdit="1"/>
+              </p:cNvSpPr>
+              <p:nvPr/>
+            </p:nvSpPr>
+            <p:spPr>
+              <a:xfrm>
+                <a:off x="2575252" y="1706852"/>
+                <a:ext cx="596531" cy="532966"/>
+              </a:xfrm>
+              <a:prstGeom prst="rect">
+                <a:avLst/>
+              </a:prstGeom>
+              <a:blipFill>
+                <a:blip r:embed="rId2"/>
+                <a:stretch>
+                  <a:fillRect/>
+                </a:stretch>
+              </a:blipFill>
+            </p:spPr>
+            <p:txBody>
+              <a:bodyPr/>
+              <a:lstStyle/>
+              <a:p>
+                <a:r>
+                  <a:rPr lang="en-US">
+                    <a:noFill/>
+                  </a:rPr>
+                  <a:t> </a:t>
+                </a:r>
+              </a:p>
+            </p:txBody>
+          </p:sp>
+        </mc:Fallback>
+      </mc:AlternateContent>
+      <p:graphicFrame>
+        <p:nvGraphicFramePr>
+          <p:cNvPr id="4" name="Table 4">
+            <a:extLst>
+              <a:ext uri="{FF2B5EF4-FFF2-40B4-BE49-F238E27FC236}">
+                <a16:creationId xmlns:a16="http://schemas.microsoft.com/office/drawing/2014/main" id="{A19C7E30-7ED6-DC97-3C9C-B4DAB746F0FE}"/>
+              </a:ext>
+            </a:extLst>
+          </p:cNvPr>
+          <p:cNvGraphicFramePr>
+            <a:graphicFrameLocks noGrp="1"/>
+          </p:cNvGraphicFramePr>
+          <p:nvPr>
+            <p:extLst>
+              <p:ext uri="{D42A27DB-BD31-4B8C-83A1-F6EECF244321}">
+                <p14:modId xmlns:p14="http://schemas.microsoft.com/office/powerpoint/2010/main" val="1331567336"/>
+              </p:ext>
+            </p:extLst>
+          </p:nvPr>
+        </p:nvGraphicFramePr>
+        <p:xfrm>
+          <a:off x="2575251" y="2965499"/>
+          <a:ext cx="596531" cy="370840"/>
+        </p:xfrm>
+        <a:graphic>
+          <a:graphicData uri="http://schemas.openxmlformats.org/drawingml/2006/table">
+            <a:tbl>
+              <a:tblPr firstRow="1" bandRow="1">
+                <a:tableStyleId>{5C22544A-7EE6-4342-B048-85BDC9FD1C3A}</a:tableStyleId>
+              </a:tblPr>
+              <a:tblGrid>
+                <a:gridCol w="596531">
+                  <a:extLst>
+                    <a:ext uri="{9D8B030D-6E8A-4147-A177-3AD203B41FA5}">
+                      <a16:colId xmlns:a16="http://schemas.microsoft.com/office/drawing/2014/main" val="596418570"/>
+                    </a:ext>
+                  </a:extLst>
+                </a:gridCol>
+              </a:tblGrid>
+              <a:tr h="370840">
+                <a:tc>
+                  <a:txBody>
+                    <a:bodyPr/>
+                    <a:lstStyle/>
+                    <a:p>
+                      <a:pPr algn="ctr"/>
+                      <a:r>
+                        <a:rPr lang="en-US" b="0" dirty="0">
+                          <a:solidFill>
+                            <a:schemeClr val="tx1"/>
+                          </a:solidFill>
+                        </a:rPr>
+                        <a:t>-2.3</a:t>
+                      </a:r>
+                    </a:p>
+                  </a:txBody>
+                  <a:tcPr anchor="ctr">
+                    <a:lnL w="12700" cap="flat" cmpd="sng" algn="ctr">
+                      <a:solidFill>
+                        <a:schemeClr val="tx1"/>
+                      </a:solidFill>
+                      <a:prstDash val="solid"/>
+                      <a:round/>
+                      <a:headEnd type="none" w="med" len="med"/>
+                      <a:tailEnd type="none" w="med" len="med"/>
+                    </a:lnL>
+                    <a:lnR w="12700" cap="flat" cmpd="sng" algn="ctr">
+                      <a:solidFill>
+                        <a:schemeClr val="tx1"/>
+                      </a:solidFill>
+                      <a:prstDash val="solid"/>
+                      <a:round/>
+                      <a:headEnd type="none" w="med" len="med"/>
+                      <a:tailEnd type="none" w="med" len="med"/>
+                    </a:lnR>
+                    <a:lnT w="12700" cap="flat" cmpd="sng" algn="ctr">
+                      <a:solidFill>
+                        <a:schemeClr val="tx1"/>
+                      </a:solidFill>
+                      <a:prstDash val="solid"/>
+                      <a:round/>
+                      <a:headEnd type="none" w="med" len="med"/>
+                      <a:tailEnd type="none" w="med" len="med"/>
+                    </a:lnT>
+                    <a:lnB w="12700" cap="flat" cmpd="sng" algn="ctr">
+                      <a:solidFill>
+                        <a:schemeClr val="tx1"/>
+                      </a:solidFill>
+                      <a:prstDash val="solid"/>
+                      <a:round/>
+                      <a:headEnd type="none" w="med" len="med"/>
+                      <a:tailEnd type="none" w="med" len="med"/>
+                    </a:lnB>
+                    <a:lnTlToBr w="12700" cmpd="sng">
+                      <a:noFill/>
+                      <a:prstDash val="solid"/>
+                    </a:lnTlToBr>
+                    <a:lnBlToTr w="12700" cmpd="sng">
+                      <a:noFill/>
+                      <a:prstDash val="solid"/>
+                    </a:lnBlToTr>
+                    <a:noFill/>
+                  </a:tcPr>
+                </a:tc>
+                <a:extLst>
+                  <a:ext uri="{0D108BD9-81ED-4DB2-BD59-A6C34878D82A}">
+                    <a16:rowId xmlns:a16="http://schemas.microsoft.com/office/drawing/2014/main" val="923224526"/>
+                  </a:ext>
+                </a:extLst>
+              </a:tr>
+            </a:tbl>
+          </a:graphicData>
+        </a:graphic>
+      </p:graphicFrame>
+      <mc:AlternateContent xmlns:mc="http://schemas.openxmlformats.org/markup-compatibility/2006">
+        <mc:Choice xmlns:a14="http://schemas.microsoft.com/office/drawing/2010/main" Requires="a14">
+          <p:sp>
+            <p:nvSpPr>
+              <p:cNvPr id="6" name="TextBox 5">
+                <a:extLst>
+                  <a:ext uri="{FF2B5EF4-FFF2-40B4-BE49-F238E27FC236}">
+                    <a16:creationId xmlns:a16="http://schemas.microsoft.com/office/drawing/2014/main" id="{D0C7BF26-1C7A-1994-6821-D88CEBA7CC6C}"/>
+                  </a:ext>
+                </a:extLst>
+              </p:cNvPr>
+              <p:cNvSpPr txBox="1"/>
+              <p:nvPr/>
+            </p:nvSpPr>
+            <p:spPr>
+              <a:xfrm>
+                <a:off x="8527000" y="1706852"/>
+                <a:ext cx="596531" cy="532966"/>
+              </a:xfrm>
+              <a:prstGeom prst="rect">
+                <a:avLst/>
+              </a:prstGeom>
+            </p:spPr>
+            <p:style>
+              <a:lnRef idx="2">
+                <a:schemeClr val="dk1"/>
+              </a:lnRef>
+              <a:fillRef idx="1">
+                <a:schemeClr val="lt1"/>
+              </a:fillRef>
+              <a:effectRef idx="0">
+                <a:schemeClr val="dk1"/>
+              </a:effectRef>
+              <a:fontRef idx="minor">
+                <a:schemeClr val="dk1"/>
+              </a:fontRef>
+            </p:style>
+            <p:txBody>
+              <a:bodyPr wrap="square" rtlCol="0">
+                <a:spAutoFit/>
+              </a:bodyPr>
+              <a:lstStyle/>
+              <a:p>
+                <a:pPr/>
+                <a14:m>
+                  <m:oMathPara xmlns:m="http://schemas.openxmlformats.org/officeDocument/2006/math">
+                    <m:oMathParaPr>
+                      <m:jc m:val="centerGroup"/>
+                    </m:oMathParaPr>
+                    <m:oMath xmlns:m="http://schemas.openxmlformats.org/officeDocument/2006/math">
+                      <m:sSup>
+                        <m:sSupPr>
+                          <m:ctrlPr>
+                            <a:rPr lang="en-US" sz="2800" b="1" i="1" smtClean="0">
+                              <a:latin typeface="Cambria Math" panose="02040503050406030204" pitchFamily="18" charset="0"/>
+                            </a:rPr>
+                          </m:ctrlPr>
+                        </m:sSupPr>
+                        <m:e>
+                          <m:r>
+                            <a:rPr lang="en-US" sz="2800" b="1" i="1" smtClean="0">
+                              <a:latin typeface="Cambria Math" panose="02040503050406030204" pitchFamily="18" charset="0"/>
+                            </a:rPr>
+                            <m:t>𝒍</m:t>
+                          </m:r>
+                        </m:e>
+                        <m:sup>
+                          <m:r>
+                            <a:rPr lang="en-US" sz="2800" b="1" i="1" smtClean="0">
+                              <a:latin typeface="Cambria Math" panose="02040503050406030204" pitchFamily="18" charset="0"/>
+                            </a:rPr>
+                            <m:t>𝟐</m:t>
+                          </m:r>
+                        </m:sup>
+                      </m:sSup>
+                    </m:oMath>
+                  </m:oMathPara>
+                </a14:m>
+                <a:endParaRPr lang="en-US" sz="2800" b="1" dirty="0"/>
+              </a:p>
+            </p:txBody>
+          </p:sp>
+        </mc:Choice>
+        <mc:Fallback>
+          <p:sp>
+            <p:nvSpPr>
+              <p:cNvPr id="6" name="TextBox 5">
+                <a:extLst>
+                  <a:ext uri="{FF2B5EF4-FFF2-40B4-BE49-F238E27FC236}">
+                    <a16:creationId xmlns:a16="http://schemas.microsoft.com/office/drawing/2014/main" id="{D0C7BF26-1C7A-1994-6821-D88CEBA7CC6C}"/>
+                  </a:ext>
+                </a:extLst>
+              </p:cNvPr>
+              <p:cNvSpPr txBox="1">
+                <a:spLocks noRot="1" noChangeAspect="1" noMove="1" noResize="1" noEditPoints="1" noAdjustHandles="1" noChangeArrowheads="1" noChangeShapeType="1" noTextEdit="1"/>
+              </p:cNvSpPr>
+              <p:nvPr/>
+            </p:nvSpPr>
+            <p:spPr>
+              <a:xfrm>
+                <a:off x="8527000" y="1706852"/>
+                <a:ext cx="596531" cy="532966"/>
+              </a:xfrm>
+              <a:prstGeom prst="rect">
+                <a:avLst/>
+              </a:prstGeom>
+              <a:blipFill>
+                <a:blip r:embed="rId3"/>
+                <a:stretch>
+                  <a:fillRect/>
+                </a:stretch>
+              </a:blipFill>
+            </p:spPr>
+            <p:txBody>
+              <a:bodyPr/>
+              <a:lstStyle/>
+              <a:p>
+                <a:r>
+                  <a:rPr lang="en-US">
+                    <a:noFill/>
+                  </a:rPr>
+                  <a:t> </a:t>
+                </a:r>
+              </a:p>
+            </p:txBody>
+          </p:sp>
+        </mc:Fallback>
+      </mc:AlternateContent>
+      <p:cxnSp>
+        <p:nvCxnSpPr>
+          <p:cNvPr id="8" name="Straight Connector 7">
+            <a:extLst>
+              <a:ext uri="{FF2B5EF4-FFF2-40B4-BE49-F238E27FC236}">
+                <a16:creationId xmlns:a16="http://schemas.microsoft.com/office/drawing/2014/main" id="{32CCA523-A6F5-A1E3-4C2D-FBE3F61FC355}"/>
+              </a:ext>
+            </a:extLst>
+          </p:cNvPr>
+          <p:cNvCxnSpPr>
+            <a:cxnSpLocks/>
+            <a:stCxn id="4" idx="3"/>
+            <a:endCxn id="61" idx="1"/>
+          </p:cNvCxnSpPr>
+          <p:nvPr/>
+        </p:nvCxnSpPr>
+        <p:spPr>
+          <a:xfrm flipV="1">
+            <a:off x="3171782" y="2718384"/>
+            <a:ext cx="5355217" cy="432535"/>
+          </a:xfrm>
+          <a:prstGeom prst="line">
+            <a:avLst/>
+          </a:prstGeom>
+          <a:ln>
+            <a:solidFill>
+              <a:schemeClr val="bg1">
+                <a:lumMod val="50000"/>
+              </a:schemeClr>
+            </a:solidFill>
+          </a:ln>
+        </p:spPr>
+        <p:style>
+          <a:lnRef idx="1">
+            <a:schemeClr val="dk1"/>
+          </a:lnRef>
+          <a:fillRef idx="0">
+            <a:schemeClr val="dk1"/>
+          </a:fillRef>
+          <a:effectRef idx="0">
+            <a:schemeClr val="dk1"/>
+          </a:effectRef>
+          <a:fontRef idx="minor">
+            <a:schemeClr val="tx1"/>
+          </a:fontRef>
+        </p:style>
+      </p:cxnSp>
+      <p:cxnSp>
+        <p:nvCxnSpPr>
+          <p:cNvPr id="16" name="Straight Connector 15">
+            <a:extLst>
+              <a:ext uri="{FF2B5EF4-FFF2-40B4-BE49-F238E27FC236}">
+                <a16:creationId xmlns:a16="http://schemas.microsoft.com/office/drawing/2014/main" id="{4B7B2B66-982F-C183-5720-368D390D6DCD}"/>
+              </a:ext>
+            </a:extLst>
+          </p:cNvPr>
+          <p:cNvCxnSpPr>
+            <a:cxnSpLocks/>
+            <a:stCxn id="4" idx="3"/>
+            <a:endCxn id="60" idx="1"/>
+          </p:cNvCxnSpPr>
+          <p:nvPr/>
+        </p:nvCxnSpPr>
+        <p:spPr>
+          <a:xfrm>
+            <a:off x="3171782" y="3150919"/>
+            <a:ext cx="5355219" cy="476865"/>
+          </a:xfrm>
+          <a:prstGeom prst="line">
+            <a:avLst/>
+          </a:prstGeom>
+          <a:ln>
+            <a:solidFill>
+              <a:schemeClr val="bg1">
+                <a:lumMod val="50000"/>
+              </a:schemeClr>
+            </a:solidFill>
+          </a:ln>
+        </p:spPr>
+        <p:style>
+          <a:lnRef idx="1">
+            <a:schemeClr val="dk1"/>
+          </a:lnRef>
+          <a:fillRef idx="0">
+            <a:schemeClr val="dk1"/>
+          </a:fillRef>
+          <a:effectRef idx="0">
+            <a:schemeClr val="dk1"/>
+          </a:effectRef>
+          <a:fontRef idx="minor">
+            <a:schemeClr val="tx1"/>
+          </a:fontRef>
+        </p:style>
+      </p:cxnSp>
+      <p:cxnSp>
+        <p:nvCxnSpPr>
+          <p:cNvPr id="19" name="Straight Connector 18">
+            <a:extLst>
+              <a:ext uri="{FF2B5EF4-FFF2-40B4-BE49-F238E27FC236}">
+                <a16:creationId xmlns:a16="http://schemas.microsoft.com/office/drawing/2014/main" id="{62C45B7B-8BE1-11EA-466A-F7437BB49895}"/>
+              </a:ext>
+            </a:extLst>
+          </p:cNvPr>
+          <p:cNvCxnSpPr>
+            <a:cxnSpLocks/>
+            <a:stCxn id="4" idx="3"/>
+            <a:endCxn id="62" idx="1"/>
+          </p:cNvCxnSpPr>
+          <p:nvPr/>
+        </p:nvCxnSpPr>
+        <p:spPr>
+          <a:xfrm>
+            <a:off x="3171782" y="3150919"/>
+            <a:ext cx="5355219" cy="1386265"/>
+          </a:xfrm>
+          <a:prstGeom prst="line">
+            <a:avLst/>
+          </a:prstGeom>
+          <a:ln>
+            <a:solidFill>
+              <a:schemeClr val="bg1">
+                <a:lumMod val="50000"/>
+              </a:schemeClr>
+            </a:solidFill>
+          </a:ln>
+        </p:spPr>
+        <p:style>
+          <a:lnRef idx="1">
+            <a:schemeClr val="dk1"/>
+          </a:lnRef>
+          <a:fillRef idx="0">
+            <a:schemeClr val="dk1"/>
+          </a:fillRef>
+          <a:effectRef idx="0">
+            <a:schemeClr val="dk1"/>
+          </a:effectRef>
+          <a:fontRef idx="minor">
+            <a:schemeClr val="tx1"/>
+          </a:fontRef>
+        </p:style>
+      </p:cxnSp>
+      <p:cxnSp>
+        <p:nvCxnSpPr>
+          <p:cNvPr id="21" name="Straight Connector 20">
+            <a:extLst>
+              <a:ext uri="{FF2B5EF4-FFF2-40B4-BE49-F238E27FC236}">
+                <a16:creationId xmlns:a16="http://schemas.microsoft.com/office/drawing/2014/main" id="{C50C5FA1-EC21-C866-834F-1D388CF870F6}"/>
+              </a:ext>
+            </a:extLst>
+          </p:cNvPr>
+          <p:cNvCxnSpPr>
+            <a:cxnSpLocks/>
+            <a:stCxn id="4" idx="3"/>
+            <a:endCxn id="63" idx="1"/>
+          </p:cNvCxnSpPr>
+          <p:nvPr/>
+        </p:nvCxnSpPr>
+        <p:spPr>
+          <a:xfrm>
+            <a:off x="3171782" y="3150919"/>
+            <a:ext cx="5355219" cy="2295665"/>
+          </a:xfrm>
+          <a:prstGeom prst="line">
+            <a:avLst/>
+          </a:prstGeom>
+          <a:ln>
+            <a:solidFill>
+              <a:schemeClr val="bg1">
+                <a:lumMod val="50000"/>
+              </a:schemeClr>
+            </a:solidFill>
+          </a:ln>
+        </p:spPr>
+        <p:style>
+          <a:lnRef idx="1">
+            <a:schemeClr val="dk1"/>
+          </a:lnRef>
+          <a:fillRef idx="0">
+            <a:schemeClr val="dk1"/>
+          </a:fillRef>
+          <a:effectRef idx="0">
+            <a:schemeClr val="dk1"/>
+          </a:effectRef>
+          <a:fontRef idx="minor">
+            <a:schemeClr val="tx1"/>
+          </a:fontRef>
+        </p:style>
+      </p:cxnSp>
+      <p:cxnSp>
+        <p:nvCxnSpPr>
+          <p:cNvPr id="32" name="Straight Connector 31">
+            <a:extLst>
+              <a:ext uri="{FF2B5EF4-FFF2-40B4-BE49-F238E27FC236}">
+                <a16:creationId xmlns:a16="http://schemas.microsoft.com/office/drawing/2014/main" id="{96F51690-AD88-5961-DECA-8F2DF0F04E83}"/>
+              </a:ext>
+            </a:extLst>
+          </p:cNvPr>
+          <p:cNvCxnSpPr>
+            <a:cxnSpLocks/>
+            <a:stCxn id="4" idx="3"/>
+            <a:endCxn id="65" idx="1"/>
+          </p:cNvCxnSpPr>
+          <p:nvPr/>
+        </p:nvCxnSpPr>
+        <p:spPr>
+          <a:xfrm>
+            <a:off x="3171782" y="3150919"/>
+            <a:ext cx="5355219" cy="3205066"/>
+          </a:xfrm>
+          <a:prstGeom prst="line">
+            <a:avLst/>
+          </a:prstGeom>
+          <a:ln>
+            <a:solidFill>
+              <a:schemeClr val="bg1">
+                <a:lumMod val="50000"/>
+              </a:schemeClr>
+            </a:solidFill>
+          </a:ln>
+        </p:spPr>
+        <p:style>
+          <a:lnRef idx="1">
+            <a:schemeClr val="dk1"/>
+          </a:lnRef>
+          <a:fillRef idx="0">
+            <a:schemeClr val="dk1"/>
+          </a:fillRef>
+          <a:effectRef idx="0">
+            <a:schemeClr val="dk1"/>
+          </a:effectRef>
+          <a:fontRef idx="minor">
+            <a:schemeClr val="tx1"/>
+          </a:fontRef>
+        </p:style>
+      </p:cxnSp>
+      <p:graphicFrame>
+        <p:nvGraphicFramePr>
+          <p:cNvPr id="51" name="Table 4">
+            <a:extLst>
+              <a:ext uri="{FF2B5EF4-FFF2-40B4-BE49-F238E27FC236}">
+                <a16:creationId xmlns:a16="http://schemas.microsoft.com/office/drawing/2014/main" id="{C24448C2-6379-EF10-3E22-9AF6DE4F7264}"/>
+              </a:ext>
+            </a:extLst>
+          </p:cNvPr>
+          <p:cNvGraphicFramePr>
+            <a:graphicFrameLocks noGrp="1"/>
+          </p:cNvGraphicFramePr>
+          <p:nvPr>
+            <p:extLst>
+              <p:ext uri="{D42A27DB-BD31-4B8C-83A1-F6EECF244321}">
+                <p14:modId xmlns:p14="http://schemas.microsoft.com/office/powerpoint/2010/main" val="549909373"/>
+              </p:ext>
+            </p:extLst>
+          </p:nvPr>
+        </p:nvGraphicFramePr>
+        <p:xfrm>
+          <a:off x="2575253" y="5114171"/>
+          <a:ext cx="596531" cy="370840"/>
+        </p:xfrm>
+        <a:graphic>
+          <a:graphicData uri="http://schemas.openxmlformats.org/drawingml/2006/table">
+            <a:tbl>
+              <a:tblPr firstRow="1" bandRow="1">
+                <a:tableStyleId>{5C22544A-7EE6-4342-B048-85BDC9FD1C3A}</a:tableStyleId>
+              </a:tblPr>
+              <a:tblGrid>
+                <a:gridCol w="596531">
+                  <a:extLst>
+                    <a:ext uri="{9D8B030D-6E8A-4147-A177-3AD203B41FA5}">
+                      <a16:colId xmlns:a16="http://schemas.microsoft.com/office/drawing/2014/main" val="596418570"/>
+                    </a:ext>
+                  </a:extLst>
+                </a:gridCol>
+              </a:tblGrid>
+              <a:tr h="370840">
+                <a:tc>
+                  <a:txBody>
+                    <a:bodyPr/>
+                    <a:lstStyle/>
+                    <a:p>
+                      <a:pPr algn="ctr"/>
+                      <a:r>
+                        <a:rPr lang="en-US" b="0" dirty="0">
+                          <a:solidFill>
+                            <a:schemeClr val="tx1"/>
+                          </a:solidFill>
+                        </a:rPr>
+                        <a:t>3.7</a:t>
+                      </a:r>
+                    </a:p>
+                  </a:txBody>
+                  <a:tcPr anchor="ctr">
+                    <a:lnL w="12700" cap="flat" cmpd="sng" algn="ctr">
+                      <a:solidFill>
+                        <a:schemeClr val="tx1"/>
+                      </a:solidFill>
+                      <a:prstDash val="solid"/>
+                      <a:round/>
+                      <a:headEnd type="none" w="med" len="med"/>
+                      <a:tailEnd type="none" w="med" len="med"/>
+                    </a:lnL>
+                    <a:lnR w="12700" cap="flat" cmpd="sng" algn="ctr">
+                      <a:solidFill>
+                        <a:schemeClr val="tx1"/>
+                      </a:solidFill>
+                      <a:prstDash val="solid"/>
+                      <a:round/>
+                      <a:headEnd type="none" w="med" len="med"/>
+                      <a:tailEnd type="none" w="med" len="med"/>
+                    </a:lnR>
+                    <a:lnT w="12700" cap="flat" cmpd="sng" algn="ctr">
+                      <a:solidFill>
+                        <a:schemeClr val="tx1"/>
+                      </a:solidFill>
+                      <a:prstDash val="solid"/>
+                      <a:round/>
+                      <a:headEnd type="none" w="med" len="med"/>
+                      <a:tailEnd type="none" w="med" len="med"/>
+                    </a:lnT>
+                    <a:lnB w="12700" cap="flat" cmpd="sng" algn="ctr">
+                      <a:solidFill>
+                        <a:schemeClr val="tx1"/>
+                      </a:solidFill>
+                      <a:prstDash val="solid"/>
+                      <a:round/>
+                      <a:headEnd type="none" w="med" len="med"/>
+                      <a:tailEnd type="none" w="med" len="med"/>
+                    </a:lnB>
+                    <a:lnTlToBr w="12700" cmpd="sng">
+                      <a:noFill/>
+                      <a:prstDash val="solid"/>
+                    </a:lnTlToBr>
+                    <a:lnBlToTr w="12700" cmpd="sng">
+                      <a:noFill/>
+                      <a:prstDash val="solid"/>
+                    </a:lnBlToTr>
+                    <a:noFill/>
+                  </a:tcPr>
+                </a:tc>
+                <a:extLst>
+                  <a:ext uri="{0D108BD9-81ED-4DB2-BD59-A6C34878D82A}">
+                    <a16:rowId xmlns:a16="http://schemas.microsoft.com/office/drawing/2014/main" val="923224526"/>
+                  </a:ext>
+                </a:extLst>
+              </a:tr>
+            </a:tbl>
+          </a:graphicData>
+        </a:graphic>
+      </p:graphicFrame>
+      <p:graphicFrame>
+        <p:nvGraphicFramePr>
+          <p:cNvPr id="59" name="Table 4">
+            <a:extLst>
+              <a:ext uri="{FF2B5EF4-FFF2-40B4-BE49-F238E27FC236}">
+                <a16:creationId xmlns:a16="http://schemas.microsoft.com/office/drawing/2014/main" id="{834C1652-2EB4-5233-7288-A73609097D74}"/>
+              </a:ext>
+            </a:extLst>
+          </p:cNvPr>
+          <p:cNvGraphicFramePr>
+            <a:graphicFrameLocks noGrp="1"/>
+          </p:cNvGraphicFramePr>
+          <p:nvPr>
+            <p:extLst>
+              <p:ext uri="{D42A27DB-BD31-4B8C-83A1-F6EECF244321}">
+                <p14:modId xmlns:p14="http://schemas.microsoft.com/office/powerpoint/2010/main" val="1074298586"/>
+              </p:ext>
+            </p:extLst>
+          </p:nvPr>
+        </p:nvGraphicFramePr>
+        <p:xfrm>
+          <a:off x="2575253" y="4039835"/>
+          <a:ext cx="596531" cy="370840"/>
+        </p:xfrm>
+        <a:graphic>
+          <a:graphicData uri="http://schemas.openxmlformats.org/drawingml/2006/table">
+            <a:tbl>
+              <a:tblPr firstRow="1" bandRow="1">
+                <a:tableStyleId>{5C22544A-7EE6-4342-B048-85BDC9FD1C3A}</a:tableStyleId>
+              </a:tblPr>
+              <a:tblGrid>
+                <a:gridCol w="596531">
+                  <a:extLst>
+                    <a:ext uri="{9D8B030D-6E8A-4147-A177-3AD203B41FA5}">
+                      <a16:colId xmlns:a16="http://schemas.microsoft.com/office/drawing/2014/main" val="596418570"/>
+                    </a:ext>
+                  </a:extLst>
+                </a:gridCol>
+              </a:tblGrid>
+              <a:tr h="370840">
+                <a:tc>
+                  <a:txBody>
+                    <a:bodyPr/>
+                    <a:lstStyle/>
+                    <a:p>
+                      <a:pPr algn="ctr"/>
+                      <a:r>
+                        <a:rPr lang="en-US" b="0" dirty="0">
+                          <a:solidFill>
+                            <a:schemeClr val="tx1"/>
+                          </a:solidFill>
+                        </a:rPr>
+                        <a:t>0.5</a:t>
+                      </a:r>
+                    </a:p>
+                  </a:txBody>
+                  <a:tcPr anchor="ctr">
+                    <a:lnL w="12700" cap="flat" cmpd="sng" algn="ctr">
+                      <a:solidFill>
+                        <a:schemeClr val="tx1"/>
+                      </a:solidFill>
+                      <a:prstDash val="solid"/>
+                      <a:round/>
+                      <a:headEnd type="none" w="med" len="med"/>
+                      <a:tailEnd type="none" w="med" len="med"/>
+                    </a:lnL>
+                    <a:lnR w="12700" cap="flat" cmpd="sng" algn="ctr">
+                      <a:solidFill>
+                        <a:schemeClr val="tx1"/>
+                      </a:solidFill>
+                      <a:prstDash val="solid"/>
+                      <a:round/>
+                      <a:headEnd type="none" w="med" len="med"/>
+                      <a:tailEnd type="none" w="med" len="med"/>
+                    </a:lnR>
+                    <a:lnT w="12700" cap="flat" cmpd="sng" algn="ctr">
+                      <a:solidFill>
+                        <a:schemeClr val="tx1"/>
+                      </a:solidFill>
+                      <a:prstDash val="solid"/>
+                      <a:round/>
+                      <a:headEnd type="none" w="med" len="med"/>
+                      <a:tailEnd type="none" w="med" len="med"/>
+                    </a:lnT>
+                    <a:lnB w="12700" cap="flat" cmpd="sng" algn="ctr">
+                      <a:solidFill>
+                        <a:schemeClr val="tx1"/>
+                      </a:solidFill>
+                      <a:prstDash val="solid"/>
+                      <a:round/>
+                      <a:headEnd type="none" w="med" len="med"/>
+                      <a:tailEnd type="none" w="med" len="med"/>
+                    </a:lnB>
+                    <a:lnTlToBr w="12700" cmpd="sng">
+                      <a:noFill/>
+                      <a:prstDash val="solid"/>
+                    </a:lnTlToBr>
+                    <a:lnBlToTr w="12700" cmpd="sng">
+                      <a:noFill/>
+                      <a:prstDash val="solid"/>
+                    </a:lnBlToTr>
+                    <a:noFill/>
+                  </a:tcPr>
+                </a:tc>
+                <a:extLst>
+                  <a:ext uri="{0D108BD9-81ED-4DB2-BD59-A6C34878D82A}">
+                    <a16:rowId xmlns:a16="http://schemas.microsoft.com/office/drawing/2014/main" val="923224526"/>
+                  </a:ext>
+                </a:extLst>
+              </a:tr>
+            </a:tbl>
+          </a:graphicData>
+        </a:graphic>
+      </p:graphicFrame>
+      <p:graphicFrame>
+        <p:nvGraphicFramePr>
+          <p:cNvPr id="60" name="Table 4">
+            <a:extLst>
+              <a:ext uri="{FF2B5EF4-FFF2-40B4-BE49-F238E27FC236}">
+                <a16:creationId xmlns:a16="http://schemas.microsoft.com/office/drawing/2014/main" id="{D8BF0A40-598F-8D45-3062-AA4C589A39C4}"/>
+              </a:ext>
+            </a:extLst>
+          </p:cNvPr>
+          <p:cNvGraphicFramePr>
+            <a:graphicFrameLocks noGrp="1"/>
+          </p:cNvGraphicFramePr>
+          <p:nvPr>
+            <p:extLst>
+              <p:ext uri="{D42A27DB-BD31-4B8C-83A1-F6EECF244321}">
+                <p14:modId xmlns:p14="http://schemas.microsoft.com/office/powerpoint/2010/main" val="4043698216"/>
+              </p:ext>
+            </p:extLst>
+          </p:nvPr>
+        </p:nvGraphicFramePr>
+        <p:xfrm>
+          <a:off x="8527001" y="3442364"/>
+          <a:ext cx="596531" cy="370840"/>
+        </p:xfrm>
+        <a:graphic>
+          <a:graphicData uri="http://schemas.openxmlformats.org/drawingml/2006/table">
+            <a:tbl>
+              <a:tblPr firstRow="1" bandRow="1">
+                <a:tableStyleId>{5C22544A-7EE6-4342-B048-85BDC9FD1C3A}</a:tableStyleId>
+              </a:tblPr>
+              <a:tblGrid>
+                <a:gridCol w="596531">
+                  <a:extLst>
+                    <a:ext uri="{9D8B030D-6E8A-4147-A177-3AD203B41FA5}">
+                      <a16:colId xmlns:a16="http://schemas.microsoft.com/office/drawing/2014/main" val="596418570"/>
+                    </a:ext>
+                  </a:extLst>
+                </a:gridCol>
+              </a:tblGrid>
+              <a:tr h="370840">
+                <a:tc>
+                  <a:txBody>
+                    <a:bodyPr/>
+                    <a:lstStyle/>
+                    <a:p>
+                      <a:pPr algn="ctr"/>
+                      <a:r>
+                        <a:rPr lang="en-US" b="0" dirty="0">
+                          <a:solidFill>
+                            <a:schemeClr val="tx1"/>
+                          </a:solidFill>
+                        </a:rPr>
+                        <a:t>-1.5</a:t>
+                      </a:r>
+                    </a:p>
+                  </a:txBody>
+                  <a:tcPr anchor="ctr">
+                    <a:lnL w="12700" cap="flat" cmpd="sng" algn="ctr">
+                      <a:solidFill>
+                        <a:schemeClr val="tx1"/>
+                      </a:solidFill>
+                      <a:prstDash val="solid"/>
+                      <a:round/>
+                      <a:headEnd type="none" w="med" len="med"/>
+                      <a:tailEnd type="none" w="med" len="med"/>
+                    </a:lnL>
+                    <a:lnR w="12700" cap="flat" cmpd="sng" algn="ctr">
+                      <a:solidFill>
+                        <a:schemeClr val="tx1"/>
+                      </a:solidFill>
+                      <a:prstDash val="solid"/>
+                      <a:round/>
+                      <a:headEnd type="none" w="med" len="med"/>
+                      <a:tailEnd type="none" w="med" len="med"/>
+                    </a:lnR>
+                    <a:lnT w="12700" cap="flat" cmpd="sng" algn="ctr">
+                      <a:solidFill>
+                        <a:schemeClr val="tx1"/>
+                      </a:solidFill>
+                      <a:prstDash val="solid"/>
+                      <a:round/>
+                      <a:headEnd type="none" w="med" len="med"/>
+                      <a:tailEnd type="none" w="med" len="med"/>
+                    </a:lnT>
+                    <a:lnB w="12700" cap="flat" cmpd="sng" algn="ctr">
+                      <a:solidFill>
+                        <a:schemeClr val="tx1"/>
+                      </a:solidFill>
+                      <a:prstDash val="solid"/>
+                      <a:round/>
+                      <a:headEnd type="none" w="med" len="med"/>
+                      <a:tailEnd type="none" w="med" len="med"/>
+                    </a:lnB>
+                    <a:lnTlToBr w="12700" cmpd="sng">
+                      <a:noFill/>
+                      <a:prstDash val="solid"/>
+                    </a:lnTlToBr>
+                    <a:lnBlToTr w="12700" cmpd="sng">
+                      <a:noFill/>
+                      <a:prstDash val="solid"/>
+                    </a:lnBlToTr>
+                    <a:noFill/>
+                  </a:tcPr>
+                </a:tc>
+                <a:extLst>
+                  <a:ext uri="{0D108BD9-81ED-4DB2-BD59-A6C34878D82A}">
+                    <a16:rowId xmlns:a16="http://schemas.microsoft.com/office/drawing/2014/main" val="923224526"/>
+                  </a:ext>
+                </a:extLst>
+              </a:tr>
+            </a:tbl>
+          </a:graphicData>
+        </a:graphic>
+      </p:graphicFrame>
+      <p:graphicFrame>
+        <p:nvGraphicFramePr>
+          <p:cNvPr id="61" name="Table 4">
+            <a:extLst>
+              <a:ext uri="{FF2B5EF4-FFF2-40B4-BE49-F238E27FC236}">
+                <a16:creationId xmlns:a16="http://schemas.microsoft.com/office/drawing/2014/main" id="{2E0235B6-5257-C8CA-2427-7432AAA3D813}"/>
+              </a:ext>
+            </a:extLst>
+          </p:cNvPr>
+          <p:cNvGraphicFramePr>
+            <a:graphicFrameLocks noGrp="1"/>
+          </p:cNvGraphicFramePr>
+          <p:nvPr>
+            <p:extLst>
+              <p:ext uri="{D42A27DB-BD31-4B8C-83A1-F6EECF244321}">
+                <p14:modId xmlns:p14="http://schemas.microsoft.com/office/powerpoint/2010/main" val="931196178"/>
+              </p:ext>
+            </p:extLst>
+          </p:nvPr>
+        </p:nvGraphicFramePr>
+        <p:xfrm>
+          <a:off x="8526999" y="2532964"/>
+          <a:ext cx="596531" cy="370840"/>
+        </p:xfrm>
+        <a:graphic>
+          <a:graphicData uri="http://schemas.openxmlformats.org/drawingml/2006/table">
+            <a:tbl>
+              <a:tblPr firstRow="1" bandRow="1">
+                <a:tableStyleId>{5C22544A-7EE6-4342-B048-85BDC9FD1C3A}</a:tableStyleId>
+              </a:tblPr>
+              <a:tblGrid>
+                <a:gridCol w="596531">
+                  <a:extLst>
+                    <a:ext uri="{9D8B030D-6E8A-4147-A177-3AD203B41FA5}">
+                      <a16:colId xmlns:a16="http://schemas.microsoft.com/office/drawing/2014/main" val="596418570"/>
+                    </a:ext>
+                  </a:extLst>
+                </a:gridCol>
+              </a:tblGrid>
+              <a:tr h="370840">
+                <a:tc>
+                  <a:txBody>
+                    <a:bodyPr/>
+                    <a:lstStyle/>
+                    <a:p>
+                      <a:pPr algn="ctr"/>
+                      <a:r>
+                        <a:rPr lang="en-US" b="0" dirty="0">
+                          <a:solidFill>
+                            <a:schemeClr val="tx1"/>
+                          </a:solidFill>
+                        </a:rPr>
+                        <a:t>-5.6</a:t>
+                      </a:r>
+                    </a:p>
+                  </a:txBody>
+                  <a:tcPr anchor="ctr">
+                    <a:lnL w="12700" cap="flat" cmpd="sng" algn="ctr">
+                      <a:solidFill>
+                        <a:schemeClr val="tx1"/>
+                      </a:solidFill>
+                      <a:prstDash val="solid"/>
+                      <a:round/>
+                      <a:headEnd type="none" w="med" len="med"/>
+                      <a:tailEnd type="none" w="med" len="med"/>
+                    </a:lnL>
+                    <a:lnR w="12700" cap="flat" cmpd="sng" algn="ctr">
+                      <a:solidFill>
+                        <a:schemeClr val="tx1"/>
+                      </a:solidFill>
+                      <a:prstDash val="solid"/>
+                      <a:round/>
+                      <a:headEnd type="none" w="med" len="med"/>
+                      <a:tailEnd type="none" w="med" len="med"/>
+                    </a:lnR>
+                    <a:lnT w="12700" cap="flat" cmpd="sng" algn="ctr">
+                      <a:solidFill>
+                        <a:schemeClr val="tx1"/>
+                      </a:solidFill>
+                      <a:prstDash val="solid"/>
+                      <a:round/>
+                      <a:headEnd type="none" w="med" len="med"/>
+                      <a:tailEnd type="none" w="med" len="med"/>
+                    </a:lnT>
+                    <a:lnB w="12700" cap="flat" cmpd="sng" algn="ctr">
+                      <a:solidFill>
+                        <a:schemeClr val="tx1"/>
+                      </a:solidFill>
+                      <a:prstDash val="solid"/>
+                      <a:round/>
+                      <a:headEnd type="none" w="med" len="med"/>
+                      <a:tailEnd type="none" w="med" len="med"/>
+                    </a:lnB>
+                    <a:lnTlToBr w="12700" cmpd="sng">
+                      <a:noFill/>
+                      <a:prstDash val="solid"/>
+                    </a:lnTlToBr>
+                    <a:lnBlToTr w="12700" cmpd="sng">
+                      <a:noFill/>
+                      <a:prstDash val="solid"/>
+                    </a:lnBlToTr>
+                    <a:noFill/>
+                  </a:tcPr>
+                </a:tc>
+                <a:extLst>
+                  <a:ext uri="{0D108BD9-81ED-4DB2-BD59-A6C34878D82A}">
+                    <a16:rowId xmlns:a16="http://schemas.microsoft.com/office/drawing/2014/main" val="923224526"/>
+                  </a:ext>
+                </a:extLst>
+              </a:tr>
+            </a:tbl>
+          </a:graphicData>
+        </a:graphic>
+      </p:graphicFrame>
+      <p:graphicFrame>
+        <p:nvGraphicFramePr>
+          <p:cNvPr id="62" name="Table 4">
+            <a:extLst>
+              <a:ext uri="{FF2B5EF4-FFF2-40B4-BE49-F238E27FC236}">
+                <a16:creationId xmlns:a16="http://schemas.microsoft.com/office/drawing/2014/main" id="{AE32D253-D00F-6BB8-079D-C3C1E0D44FFD}"/>
+              </a:ext>
+            </a:extLst>
+          </p:cNvPr>
+          <p:cNvGraphicFramePr>
+            <a:graphicFrameLocks noGrp="1"/>
+          </p:cNvGraphicFramePr>
+          <p:nvPr>
+            <p:extLst>
+              <p:ext uri="{D42A27DB-BD31-4B8C-83A1-F6EECF244321}">
+                <p14:modId xmlns:p14="http://schemas.microsoft.com/office/powerpoint/2010/main" val="3001248715"/>
+              </p:ext>
+            </p:extLst>
+          </p:nvPr>
+        </p:nvGraphicFramePr>
+        <p:xfrm>
+          <a:off x="8527001" y="4351764"/>
+          <a:ext cx="596531" cy="370840"/>
+        </p:xfrm>
+        <a:graphic>
+          <a:graphicData uri="http://schemas.openxmlformats.org/drawingml/2006/table">
+            <a:tbl>
+              <a:tblPr firstRow="1" bandRow="1">
+                <a:tableStyleId>{5C22544A-7EE6-4342-B048-85BDC9FD1C3A}</a:tableStyleId>
+              </a:tblPr>
+              <a:tblGrid>
+                <a:gridCol w="596531">
+                  <a:extLst>
+                    <a:ext uri="{9D8B030D-6E8A-4147-A177-3AD203B41FA5}">
+                      <a16:colId xmlns:a16="http://schemas.microsoft.com/office/drawing/2014/main" val="596418570"/>
+                    </a:ext>
+                  </a:extLst>
+                </a:gridCol>
+              </a:tblGrid>
+              <a:tr h="370840">
+                <a:tc>
+                  <a:txBody>
+                    <a:bodyPr/>
+                    <a:lstStyle/>
+                    <a:p>
+                      <a:pPr algn="ctr"/>
+                      <a:r>
+                        <a:rPr lang="en-US" b="0" dirty="0">
+                          <a:solidFill>
+                            <a:schemeClr val="tx1"/>
+                          </a:solidFill>
+                        </a:rPr>
+                        <a:t>0.9</a:t>
+                      </a:r>
+                    </a:p>
+                  </a:txBody>
+                  <a:tcPr anchor="ctr">
+                    <a:lnL w="12700" cap="flat" cmpd="sng" algn="ctr">
+                      <a:solidFill>
+                        <a:schemeClr val="tx1"/>
+                      </a:solidFill>
+                      <a:prstDash val="solid"/>
+                      <a:round/>
+                      <a:headEnd type="none" w="med" len="med"/>
+                      <a:tailEnd type="none" w="med" len="med"/>
+                    </a:lnL>
+                    <a:lnR w="12700" cap="flat" cmpd="sng" algn="ctr">
+                      <a:solidFill>
+                        <a:schemeClr val="tx1"/>
+                      </a:solidFill>
+                      <a:prstDash val="solid"/>
+                      <a:round/>
+                      <a:headEnd type="none" w="med" len="med"/>
+                      <a:tailEnd type="none" w="med" len="med"/>
+                    </a:lnR>
+                    <a:lnT w="12700" cap="flat" cmpd="sng" algn="ctr">
+                      <a:solidFill>
+                        <a:schemeClr val="tx1"/>
+                      </a:solidFill>
+                      <a:prstDash val="solid"/>
+                      <a:round/>
+                      <a:headEnd type="none" w="med" len="med"/>
+                      <a:tailEnd type="none" w="med" len="med"/>
+                    </a:lnT>
+                    <a:lnB w="12700" cap="flat" cmpd="sng" algn="ctr">
+                      <a:solidFill>
+                        <a:schemeClr val="tx1"/>
+                      </a:solidFill>
+                      <a:prstDash val="solid"/>
+                      <a:round/>
+                      <a:headEnd type="none" w="med" len="med"/>
+                      <a:tailEnd type="none" w="med" len="med"/>
+                    </a:lnB>
+                    <a:lnTlToBr w="12700" cmpd="sng">
+                      <a:noFill/>
+                      <a:prstDash val="solid"/>
+                    </a:lnTlToBr>
+                    <a:lnBlToTr w="12700" cmpd="sng">
+                      <a:noFill/>
+                      <a:prstDash val="solid"/>
+                    </a:lnBlToTr>
+                    <a:noFill/>
+                  </a:tcPr>
+                </a:tc>
+                <a:extLst>
+                  <a:ext uri="{0D108BD9-81ED-4DB2-BD59-A6C34878D82A}">
+                    <a16:rowId xmlns:a16="http://schemas.microsoft.com/office/drawing/2014/main" val="923224526"/>
+                  </a:ext>
+                </a:extLst>
+              </a:tr>
+            </a:tbl>
+          </a:graphicData>
+        </a:graphic>
+      </p:graphicFrame>
+      <p:graphicFrame>
+        <p:nvGraphicFramePr>
+          <p:cNvPr id="63" name="Table 4">
+            <a:extLst>
+              <a:ext uri="{FF2B5EF4-FFF2-40B4-BE49-F238E27FC236}">
+                <a16:creationId xmlns:a16="http://schemas.microsoft.com/office/drawing/2014/main" id="{FC4FF3CB-DE2F-04CC-34E0-3EF8E6213B67}"/>
+              </a:ext>
+            </a:extLst>
+          </p:cNvPr>
+          <p:cNvGraphicFramePr>
+            <a:graphicFrameLocks noGrp="1"/>
+          </p:cNvGraphicFramePr>
+          <p:nvPr>
+            <p:extLst>
+              <p:ext uri="{D42A27DB-BD31-4B8C-83A1-F6EECF244321}">
+                <p14:modId xmlns:p14="http://schemas.microsoft.com/office/powerpoint/2010/main" val="984248530"/>
+              </p:ext>
+            </p:extLst>
+          </p:nvPr>
+        </p:nvGraphicFramePr>
+        <p:xfrm>
+          <a:off x="8527001" y="5261164"/>
+          <a:ext cx="596531" cy="370840"/>
+        </p:xfrm>
+        <a:graphic>
+          <a:graphicData uri="http://schemas.openxmlformats.org/drawingml/2006/table">
+            <a:tbl>
+              <a:tblPr firstRow="1" bandRow="1">
+                <a:tableStyleId>{5C22544A-7EE6-4342-B048-85BDC9FD1C3A}</a:tableStyleId>
+              </a:tblPr>
+              <a:tblGrid>
+                <a:gridCol w="596531">
+                  <a:extLst>
+                    <a:ext uri="{9D8B030D-6E8A-4147-A177-3AD203B41FA5}">
+                      <a16:colId xmlns:a16="http://schemas.microsoft.com/office/drawing/2014/main" val="596418570"/>
+                    </a:ext>
+                  </a:extLst>
+                </a:gridCol>
+              </a:tblGrid>
+              <a:tr h="370840">
+                <a:tc>
+                  <a:txBody>
+                    <a:bodyPr/>
+                    <a:lstStyle/>
+                    <a:p>
+                      <a:pPr algn="ctr"/>
+                      <a:r>
+                        <a:rPr lang="en-US" b="0" dirty="0">
+                          <a:solidFill>
+                            <a:schemeClr val="tx1"/>
+                          </a:solidFill>
+                        </a:rPr>
+                        <a:t>4.3</a:t>
+                      </a:r>
+                    </a:p>
+                  </a:txBody>
+                  <a:tcPr anchor="ctr">
+                    <a:lnL w="12700" cap="flat" cmpd="sng" algn="ctr">
+                      <a:solidFill>
+                        <a:schemeClr val="tx1"/>
+                      </a:solidFill>
+                      <a:prstDash val="solid"/>
+                      <a:round/>
+                      <a:headEnd type="none" w="med" len="med"/>
+                      <a:tailEnd type="none" w="med" len="med"/>
+                    </a:lnL>
+                    <a:lnR w="12700" cap="flat" cmpd="sng" algn="ctr">
+                      <a:solidFill>
+                        <a:schemeClr val="tx1"/>
+                      </a:solidFill>
+                      <a:prstDash val="solid"/>
+                      <a:round/>
+                      <a:headEnd type="none" w="med" len="med"/>
+                      <a:tailEnd type="none" w="med" len="med"/>
+                    </a:lnR>
+                    <a:lnT w="12700" cap="flat" cmpd="sng" algn="ctr">
+                      <a:solidFill>
+                        <a:schemeClr val="tx1"/>
+                      </a:solidFill>
+                      <a:prstDash val="solid"/>
+                      <a:round/>
+                      <a:headEnd type="none" w="med" len="med"/>
+                      <a:tailEnd type="none" w="med" len="med"/>
+                    </a:lnT>
+                    <a:lnB w="12700" cap="flat" cmpd="sng" algn="ctr">
+                      <a:solidFill>
+                        <a:schemeClr val="tx1"/>
+                      </a:solidFill>
+                      <a:prstDash val="solid"/>
+                      <a:round/>
+                      <a:headEnd type="none" w="med" len="med"/>
+                      <a:tailEnd type="none" w="med" len="med"/>
+                    </a:lnB>
+                    <a:lnTlToBr w="12700" cmpd="sng">
+                      <a:noFill/>
+                      <a:prstDash val="solid"/>
+                    </a:lnTlToBr>
+                    <a:lnBlToTr w="12700" cmpd="sng">
+                      <a:noFill/>
+                      <a:prstDash val="solid"/>
+                    </a:lnBlToTr>
+                    <a:noFill/>
+                  </a:tcPr>
+                </a:tc>
+                <a:extLst>
+                  <a:ext uri="{0D108BD9-81ED-4DB2-BD59-A6C34878D82A}">
+                    <a16:rowId xmlns:a16="http://schemas.microsoft.com/office/drawing/2014/main" val="923224526"/>
+                  </a:ext>
+                </a:extLst>
+              </a:tr>
+            </a:tbl>
+          </a:graphicData>
+        </a:graphic>
+      </p:graphicFrame>
+      <p:graphicFrame>
+        <p:nvGraphicFramePr>
+          <p:cNvPr id="65" name="Table 4">
+            <a:extLst>
+              <a:ext uri="{FF2B5EF4-FFF2-40B4-BE49-F238E27FC236}">
+                <a16:creationId xmlns:a16="http://schemas.microsoft.com/office/drawing/2014/main" id="{B7356ED1-633A-5157-AF9D-4B76B18A3425}"/>
+              </a:ext>
+            </a:extLst>
+          </p:cNvPr>
+          <p:cNvGraphicFramePr>
+            <a:graphicFrameLocks noGrp="1"/>
+          </p:cNvGraphicFramePr>
+          <p:nvPr>
+            <p:extLst>
+              <p:ext uri="{D42A27DB-BD31-4B8C-83A1-F6EECF244321}">
+                <p14:modId xmlns:p14="http://schemas.microsoft.com/office/powerpoint/2010/main" val="4032230424"/>
+              </p:ext>
+            </p:extLst>
+          </p:nvPr>
+        </p:nvGraphicFramePr>
+        <p:xfrm>
+          <a:off x="8527001" y="6170565"/>
+          <a:ext cx="596531" cy="370840"/>
+        </p:xfrm>
+        <a:graphic>
+          <a:graphicData uri="http://schemas.openxmlformats.org/drawingml/2006/table">
+            <a:tbl>
+              <a:tblPr firstRow="1" bandRow="1">
+                <a:tableStyleId>{5C22544A-7EE6-4342-B048-85BDC9FD1C3A}</a:tableStyleId>
+              </a:tblPr>
+              <a:tblGrid>
+                <a:gridCol w="596531">
+                  <a:extLst>
+                    <a:ext uri="{9D8B030D-6E8A-4147-A177-3AD203B41FA5}">
+                      <a16:colId xmlns:a16="http://schemas.microsoft.com/office/drawing/2014/main" val="596418570"/>
+                    </a:ext>
+                  </a:extLst>
+                </a:gridCol>
+              </a:tblGrid>
+              <a:tr h="370840">
+                <a:tc>
+                  <a:txBody>
+                    <a:bodyPr/>
+                    <a:lstStyle/>
+                    <a:p>
+                      <a:pPr algn="ctr"/>
+                      <a:r>
+                        <a:rPr lang="en-US" b="0" dirty="0">
+                          <a:solidFill>
+                            <a:schemeClr val="tx1"/>
+                          </a:solidFill>
+                        </a:rPr>
+                        <a:t>-0.8</a:t>
+                      </a:r>
+                    </a:p>
+                  </a:txBody>
+                  <a:tcPr anchor="ctr">
+                    <a:lnL w="12700" cap="flat" cmpd="sng" algn="ctr">
+                      <a:solidFill>
+                        <a:schemeClr val="tx1"/>
+                      </a:solidFill>
+                      <a:prstDash val="solid"/>
+                      <a:round/>
+                      <a:headEnd type="none" w="med" len="med"/>
+                      <a:tailEnd type="none" w="med" len="med"/>
+                    </a:lnL>
+                    <a:lnR w="12700" cap="flat" cmpd="sng" algn="ctr">
+                      <a:solidFill>
+                        <a:schemeClr val="tx1"/>
+                      </a:solidFill>
+                      <a:prstDash val="solid"/>
+                      <a:round/>
+                      <a:headEnd type="none" w="med" len="med"/>
+                      <a:tailEnd type="none" w="med" len="med"/>
+                    </a:lnR>
+                    <a:lnT w="12700" cap="flat" cmpd="sng" algn="ctr">
+                      <a:solidFill>
+                        <a:schemeClr val="tx1"/>
+                      </a:solidFill>
+                      <a:prstDash val="solid"/>
+                      <a:round/>
+                      <a:headEnd type="none" w="med" len="med"/>
+                      <a:tailEnd type="none" w="med" len="med"/>
+                    </a:lnT>
+                    <a:lnB w="12700" cap="flat" cmpd="sng" algn="ctr">
+                      <a:solidFill>
+                        <a:schemeClr val="tx1"/>
+                      </a:solidFill>
+                      <a:prstDash val="solid"/>
+                      <a:round/>
+                      <a:headEnd type="none" w="med" len="med"/>
+                      <a:tailEnd type="none" w="med" len="med"/>
+                    </a:lnB>
+                    <a:lnTlToBr w="12700" cmpd="sng">
+                      <a:noFill/>
+                      <a:prstDash val="solid"/>
+                    </a:lnTlToBr>
+                    <a:lnBlToTr w="12700" cmpd="sng">
+                      <a:noFill/>
+                      <a:prstDash val="solid"/>
+                    </a:lnBlToTr>
+                    <a:noFill/>
+                  </a:tcPr>
+                </a:tc>
+                <a:extLst>
+                  <a:ext uri="{0D108BD9-81ED-4DB2-BD59-A6C34878D82A}">
+                    <a16:rowId xmlns:a16="http://schemas.microsoft.com/office/drawing/2014/main" val="923224526"/>
+                  </a:ext>
+                </a:extLst>
+              </a:tr>
+            </a:tbl>
+          </a:graphicData>
+        </a:graphic>
+      </p:graphicFrame>
+      <p:graphicFrame>
+        <p:nvGraphicFramePr>
+          <p:cNvPr id="71" name="Table 4">
+            <a:extLst>
+              <a:ext uri="{FF2B5EF4-FFF2-40B4-BE49-F238E27FC236}">
+                <a16:creationId xmlns:a16="http://schemas.microsoft.com/office/drawing/2014/main" id="{9573EAA6-B5DC-F4A8-8A06-F41C6D292EBB}"/>
+              </a:ext>
+            </a:extLst>
+          </p:cNvPr>
+          <p:cNvGraphicFramePr>
+            <a:graphicFrameLocks noGrp="1"/>
+          </p:cNvGraphicFramePr>
+          <p:nvPr>
+            <p:extLst>
+              <p:ext uri="{D42A27DB-BD31-4B8C-83A1-F6EECF244321}">
+                <p14:modId xmlns:p14="http://schemas.microsoft.com/office/powerpoint/2010/main" val="1505792494"/>
+              </p:ext>
+            </p:extLst>
+          </p:nvPr>
+        </p:nvGraphicFramePr>
+        <p:xfrm>
+          <a:off x="5177539" y="2687369"/>
+          <a:ext cx="652185" cy="370840"/>
+        </p:xfrm>
+        <a:graphic>
+          <a:graphicData uri="http://schemas.openxmlformats.org/drawingml/2006/table">
+            <a:tbl>
+              <a:tblPr firstRow="1" bandRow="1">
+                <a:tableStyleId>{5C22544A-7EE6-4342-B048-85BDC9FD1C3A}</a:tableStyleId>
+              </a:tblPr>
+              <a:tblGrid>
+                <a:gridCol w="652185">
+                  <a:extLst>
+                    <a:ext uri="{9D8B030D-6E8A-4147-A177-3AD203B41FA5}">
+                      <a16:colId xmlns:a16="http://schemas.microsoft.com/office/drawing/2014/main" val="596418570"/>
+                    </a:ext>
+                  </a:extLst>
+                </a:gridCol>
+              </a:tblGrid>
+              <a:tr h="370840">
+                <a:tc>
+                  <a:txBody>
+                    <a:bodyPr/>
+                    <a:lstStyle/>
+                    <a:p>
+                      <a:pPr algn="ctr"/>
+                      <a:r>
+                        <a:rPr lang="en-US" b="0" dirty="0">
+                          <a:solidFill>
+                            <a:schemeClr val="bg1">
+                              <a:lumMod val="50000"/>
+                            </a:schemeClr>
+                          </a:solidFill>
+                        </a:rPr>
+                        <a:t>0.5</a:t>
+                      </a:r>
+                    </a:p>
+                  </a:txBody>
+                  <a:tcPr anchor="ctr">
+                    <a:lnL w="12700" cap="flat" cmpd="sng" algn="ctr">
+                      <a:solidFill>
+                        <a:schemeClr val="bg1">
+                          <a:lumMod val="50000"/>
+                        </a:schemeClr>
+                      </a:solidFill>
+                      <a:prstDash val="solid"/>
+                      <a:round/>
+                      <a:headEnd type="none" w="med" len="med"/>
+                      <a:tailEnd type="none" w="med" len="med"/>
+                    </a:lnL>
+                    <a:lnR w="12700" cap="flat" cmpd="sng" algn="ctr">
+                      <a:solidFill>
+                        <a:schemeClr val="bg1">
+                          <a:lumMod val="50000"/>
+                        </a:schemeClr>
+                      </a:solidFill>
+                      <a:prstDash val="solid"/>
+                      <a:round/>
+                      <a:headEnd type="none" w="med" len="med"/>
+                      <a:tailEnd type="none" w="med" len="med"/>
+                    </a:lnR>
+                    <a:lnT w="12700" cap="flat" cmpd="sng" algn="ctr">
+                      <a:solidFill>
+                        <a:schemeClr val="bg1">
+                          <a:lumMod val="50000"/>
+                        </a:schemeClr>
+                      </a:solidFill>
+                      <a:prstDash val="solid"/>
+                      <a:round/>
+                      <a:headEnd type="none" w="med" len="med"/>
+                      <a:tailEnd type="none" w="med" len="med"/>
+                    </a:lnT>
+                    <a:lnB w="12700" cap="flat" cmpd="sng" algn="ctr">
+                      <a:solidFill>
+                        <a:schemeClr val="bg1">
+                          <a:lumMod val="50000"/>
+                        </a:schemeClr>
+                      </a:solidFill>
+                      <a:prstDash val="solid"/>
+                      <a:round/>
+                      <a:headEnd type="none" w="med" len="med"/>
+                      <a:tailEnd type="none" w="med" len="med"/>
+                    </a:lnB>
+                    <a:lnTlToBr w="12700" cmpd="sng">
+                      <a:noFill/>
+                      <a:prstDash val="solid"/>
+                    </a:lnTlToBr>
+                    <a:lnBlToTr w="12700" cmpd="sng">
+                      <a:noFill/>
+                      <a:prstDash val="solid"/>
+                    </a:lnBlToTr>
+                    <a:solidFill>
+                      <a:schemeClr val="bg1"/>
+                    </a:solidFill>
+                  </a:tcPr>
+                </a:tc>
+                <a:extLst>
+                  <a:ext uri="{0D108BD9-81ED-4DB2-BD59-A6C34878D82A}">
+                    <a16:rowId xmlns:a16="http://schemas.microsoft.com/office/drawing/2014/main" val="923224526"/>
+                  </a:ext>
+                </a:extLst>
+              </a:tr>
+            </a:tbl>
+          </a:graphicData>
+        </a:graphic>
+      </p:graphicFrame>
+      <p:graphicFrame>
+        <p:nvGraphicFramePr>
+          <p:cNvPr id="72" name="Table 4">
+            <a:extLst>
+              <a:ext uri="{FF2B5EF4-FFF2-40B4-BE49-F238E27FC236}">
+                <a16:creationId xmlns:a16="http://schemas.microsoft.com/office/drawing/2014/main" id="{691A82F7-424B-60FD-8DF1-4E98FB2CC3F6}"/>
+              </a:ext>
+            </a:extLst>
+          </p:cNvPr>
+          <p:cNvGraphicFramePr>
+            <a:graphicFrameLocks noGrp="1"/>
+          </p:cNvGraphicFramePr>
+          <p:nvPr>
+            <p:extLst>
+              <p:ext uri="{D42A27DB-BD31-4B8C-83A1-F6EECF244321}">
+                <p14:modId xmlns:p14="http://schemas.microsoft.com/office/powerpoint/2010/main" val="3961940480"/>
+              </p:ext>
+            </p:extLst>
+          </p:nvPr>
+        </p:nvGraphicFramePr>
+        <p:xfrm>
+          <a:off x="5177539" y="3536887"/>
+          <a:ext cx="652184" cy="370840"/>
+        </p:xfrm>
+        <a:graphic>
+          <a:graphicData uri="http://schemas.openxmlformats.org/drawingml/2006/table">
+            <a:tbl>
+              <a:tblPr firstRow="1" bandRow="1">
+                <a:tableStyleId>{5C22544A-7EE6-4342-B048-85BDC9FD1C3A}</a:tableStyleId>
+              </a:tblPr>
+              <a:tblGrid>
+                <a:gridCol w="652184">
+                  <a:extLst>
+                    <a:ext uri="{9D8B030D-6E8A-4147-A177-3AD203B41FA5}">
+                      <a16:colId xmlns:a16="http://schemas.microsoft.com/office/drawing/2014/main" val="596418570"/>
+                    </a:ext>
+                  </a:extLst>
+                </a:gridCol>
+              </a:tblGrid>
+              <a:tr h="370840">
+                <a:tc>
+                  <a:txBody>
+                    <a:bodyPr/>
+                    <a:lstStyle/>
+                    <a:p>
+                      <a:pPr algn="ctr"/>
+                      <a:r>
+                        <a:rPr lang="en-US" b="0" dirty="0">
+                          <a:solidFill>
+                            <a:schemeClr val="bg1">
+                              <a:lumMod val="50000"/>
+                            </a:schemeClr>
+                          </a:solidFill>
+                        </a:rPr>
+                        <a:t>2.8</a:t>
+                      </a:r>
+                    </a:p>
+                  </a:txBody>
+                  <a:tcPr anchor="ctr">
+                    <a:lnL w="12700" cap="flat" cmpd="sng" algn="ctr">
+                      <a:solidFill>
+                        <a:schemeClr val="bg1">
+                          <a:lumMod val="50000"/>
+                        </a:schemeClr>
+                      </a:solidFill>
+                      <a:prstDash val="solid"/>
+                      <a:round/>
+                      <a:headEnd type="none" w="med" len="med"/>
+                      <a:tailEnd type="none" w="med" len="med"/>
+                    </a:lnL>
+                    <a:lnR w="12700" cap="flat" cmpd="sng" algn="ctr">
+                      <a:solidFill>
+                        <a:schemeClr val="bg1">
+                          <a:lumMod val="50000"/>
+                        </a:schemeClr>
+                      </a:solidFill>
+                      <a:prstDash val="solid"/>
+                      <a:round/>
+                      <a:headEnd type="none" w="med" len="med"/>
+                      <a:tailEnd type="none" w="med" len="med"/>
+                    </a:lnR>
+                    <a:lnT w="12700" cap="flat" cmpd="sng" algn="ctr">
+                      <a:solidFill>
+                        <a:schemeClr val="bg1">
+                          <a:lumMod val="50000"/>
+                        </a:schemeClr>
+                      </a:solidFill>
+                      <a:prstDash val="solid"/>
+                      <a:round/>
+                      <a:headEnd type="none" w="med" len="med"/>
+                      <a:tailEnd type="none" w="med" len="med"/>
+                    </a:lnT>
+                    <a:lnB w="12700" cap="flat" cmpd="sng" algn="ctr">
+                      <a:solidFill>
+                        <a:schemeClr val="bg1">
+                          <a:lumMod val="50000"/>
+                        </a:schemeClr>
+                      </a:solidFill>
+                      <a:prstDash val="solid"/>
+                      <a:round/>
+                      <a:headEnd type="none" w="med" len="med"/>
+                      <a:tailEnd type="none" w="med" len="med"/>
+                    </a:lnB>
+                    <a:lnTlToBr w="12700" cmpd="sng">
+                      <a:noFill/>
+                      <a:prstDash val="solid"/>
+                    </a:lnTlToBr>
+                    <a:lnBlToTr w="12700" cmpd="sng">
+                      <a:noFill/>
+                      <a:prstDash val="solid"/>
+                    </a:lnBlToTr>
+                    <a:solidFill>
+                      <a:schemeClr val="bg1"/>
+                    </a:solidFill>
+                  </a:tcPr>
+                </a:tc>
+                <a:extLst>
+                  <a:ext uri="{0D108BD9-81ED-4DB2-BD59-A6C34878D82A}">
+                    <a16:rowId xmlns:a16="http://schemas.microsoft.com/office/drawing/2014/main" val="923224526"/>
+                  </a:ext>
+                </a:extLst>
+              </a:tr>
+            </a:tbl>
+          </a:graphicData>
+        </a:graphic>
+      </p:graphicFrame>
+      <p:graphicFrame>
+        <p:nvGraphicFramePr>
+          <p:cNvPr id="73" name="Table 4">
+            <a:extLst>
+              <a:ext uri="{FF2B5EF4-FFF2-40B4-BE49-F238E27FC236}">
+                <a16:creationId xmlns:a16="http://schemas.microsoft.com/office/drawing/2014/main" id="{0050D399-A90C-2DC1-213F-ABD82BD47D63}"/>
+              </a:ext>
+            </a:extLst>
+          </p:cNvPr>
+          <p:cNvGraphicFramePr>
+            <a:graphicFrameLocks noGrp="1"/>
+          </p:cNvGraphicFramePr>
+          <p:nvPr>
+            <p:extLst>
+              <p:ext uri="{D42A27DB-BD31-4B8C-83A1-F6EECF244321}">
+                <p14:modId xmlns:p14="http://schemas.microsoft.com/office/powerpoint/2010/main" val="122136391"/>
+              </p:ext>
+            </p:extLst>
+          </p:nvPr>
+        </p:nvGraphicFramePr>
+        <p:xfrm>
+          <a:off x="5177538" y="3112128"/>
+          <a:ext cx="652186" cy="370840"/>
+        </p:xfrm>
+        <a:graphic>
+          <a:graphicData uri="http://schemas.openxmlformats.org/drawingml/2006/table">
+            <a:tbl>
+              <a:tblPr firstRow="1" bandRow="1">
+                <a:tableStyleId>{5C22544A-7EE6-4342-B048-85BDC9FD1C3A}</a:tableStyleId>
+              </a:tblPr>
+              <a:tblGrid>
+                <a:gridCol w="652186">
+                  <a:extLst>
+                    <a:ext uri="{9D8B030D-6E8A-4147-A177-3AD203B41FA5}">
+                      <a16:colId xmlns:a16="http://schemas.microsoft.com/office/drawing/2014/main" val="596418570"/>
+                    </a:ext>
+                  </a:extLst>
+                </a:gridCol>
+              </a:tblGrid>
+              <a:tr h="370840">
+                <a:tc>
+                  <a:txBody>
+                    <a:bodyPr/>
+                    <a:lstStyle/>
+                    <a:p>
+                      <a:pPr algn="ctr"/>
+                      <a:r>
+                        <a:rPr lang="en-US" b="0" dirty="0">
+                          <a:solidFill>
+                            <a:schemeClr val="bg1">
+                              <a:lumMod val="50000"/>
+                            </a:schemeClr>
+                          </a:solidFill>
+                        </a:rPr>
+                        <a:t>-1.5</a:t>
+                      </a:r>
+                    </a:p>
+                  </a:txBody>
+                  <a:tcPr anchor="ctr">
+                    <a:lnL w="12700" cap="flat" cmpd="sng" algn="ctr">
+                      <a:solidFill>
+                        <a:schemeClr val="bg1">
+                          <a:lumMod val="50000"/>
+                        </a:schemeClr>
+                      </a:solidFill>
+                      <a:prstDash val="solid"/>
+                      <a:round/>
+                      <a:headEnd type="none" w="med" len="med"/>
+                      <a:tailEnd type="none" w="med" len="med"/>
+                    </a:lnL>
+                    <a:lnR w="12700" cap="flat" cmpd="sng" algn="ctr">
+                      <a:solidFill>
+                        <a:schemeClr val="bg1">
+                          <a:lumMod val="50000"/>
+                        </a:schemeClr>
+                      </a:solidFill>
+                      <a:prstDash val="solid"/>
+                      <a:round/>
+                      <a:headEnd type="none" w="med" len="med"/>
+                      <a:tailEnd type="none" w="med" len="med"/>
+                    </a:lnR>
+                    <a:lnT w="12700" cap="flat" cmpd="sng" algn="ctr">
+                      <a:solidFill>
+                        <a:schemeClr val="bg1">
+                          <a:lumMod val="50000"/>
+                        </a:schemeClr>
+                      </a:solidFill>
+                      <a:prstDash val="solid"/>
+                      <a:round/>
+                      <a:headEnd type="none" w="med" len="med"/>
+                      <a:tailEnd type="none" w="med" len="med"/>
+                    </a:lnT>
+                    <a:lnB w="12700" cap="flat" cmpd="sng" algn="ctr">
+                      <a:solidFill>
+                        <a:schemeClr val="bg1">
+                          <a:lumMod val="50000"/>
+                        </a:schemeClr>
+                      </a:solidFill>
+                      <a:prstDash val="solid"/>
+                      <a:round/>
+                      <a:headEnd type="none" w="med" len="med"/>
+                      <a:tailEnd type="none" w="med" len="med"/>
+                    </a:lnB>
+                    <a:lnTlToBr w="12700" cmpd="sng">
+                      <a:noFill/>
+                      <a:prstDash val="solid"/>
+                    </a:lnTlToBr>
+                    <a:lnBlToTr w="12700" cmpd="sng">
+                      <a:noFill/>
+                      <a:prstDash val="solid"/>
+                    </a:lnBlToTr>
+                    <a:solidFill>
+                      <a:schemeClr val="bg1"/>
+                    </a:solidFill>
+                  </a:tcPr>
+                </a:tc>
+                <a:extLst>
+                  <a:ext uri="{0D108BD9-81ED-4DB2-BD59-A6C34878D82A}">
+                    <a16:rowId xmlns:a16="http://schemas.microsoft.com/office/drawing/2014/main" val="923224526"/>
+                  </a:ext>
+                </a:extLst>
+              </a:tr>
+            </a:tbl>
+          </a:graphicData>
+        </a:graphic>
+      </p:graphicFrame>
+      <p:graphicFrame>
+        <p:nvGraphicFramePr>
+          <p:cNvPr id="74" name="Table 4">
+            <a:extLst>
+              <a:ext uri="{FF2B5EF4-FFF2-40B4-BE49-F238E27FC236}">
+                <a16:creationId xmlns:a16="http://schemas.microsoft.com/office/drawing/2014/main" id="{249F04A6-9A70-AEC2-21C6-9EB4B1A617E9}"/>
+              </a:ext>
+            </a:extLst>
+          </p:cNvPr>
+          <p:cNvGraphicFramePr>
+            <a:graphicFrameLocks noGrp="1"/>
+          </p:cNvGraphicFramePr>
+          <p:nvPr>
+            <p:extLst>
+              <p:ext uri="{D42A27DB-BD31-4B8C-83A1-F6EECF244321}">
+                <p14:modId xmlns:p14="http://schemas.microsoft.com/office/powerpoint/2010/main" val="1166898352"/>
+              </p:ext>
+            </p:extLst>
+          </p:nvPr>
+        </p:nvGraphicFramePr>
+        <p:xfrm>
+          <a:off x="5177539" y="3961646"/>
+          <a:ext cx="652184" cy="370840"/>
+        </p:xfrm>
+        <a:graphic>
+          <a:graphicData uri="http://schemas.openxmlformats.org/drawingml/2006/table">
+            <a:tbl>
+              <a:tblPr firstRow="1" bandRow="1">
+                <a:tableStyleId>{5C22544A-7EE6-4342-B048-85BDC9FD1C3A}</a:tableStyleId>
+              </a:tblPr>
+              <a:tblGrid>
+                <a:gridCol w="652184">
+                  <a:extLst>
+                    <a:ext uri="{9D8B030D-6E8A-4147-A177-3AD203B41FA5}">
+                      <a16:colId xmlns:a16="http://schemas.microsoft.com/office/drawing/2014/main" val="596418570"/>
+                    </a:ext>
+                  </a:extLst>
+                </a:gridCol>
+              </a:tblGrid>
+              <a:tr h="370840">
+                <a:tc>
+                  <a:txBody>
+                    <a:bodyPr/>
+                    <a:lstStyle/>
+                    <a:p>
+                      <a:pPr algn="ctr"/>
+                      <a:r>
+                        <a:rPr lang="en-US" b="0" dirty="0">
+                          <a:solidFill>
+                            <a:schemeClr val="bg1">
+                              <a:lumMod val="50000"/>
+                            </a:schemeClr>
+                          </a:solidFill>
+                        </a:rPr>
+                        <a:t>-1.9</a:t>
+                      </a:r>
+                    </a:p>
+                  </a:txBody>
+                  <a:tcPr anchor="ctr">
+                    <a:lnL w="12700" cap="flat" cmpd="sng" algn="ctr">
+                      <a:solidFill>
+                        <a:schemeClr val="bg1">
+                          <a:lumMod val="50000"/>
+                        </a:schemeClr>
+                      </a:solidFill>
+                      <a:prstDash val="solid"/>
+                      <a:round/>
+                      <a:headEnd type="none" w="med" len="med"/>
+                      <a:tailEnd type="none" w="med" len="med"/>
+                    </a:lnL>
+                    <a:lnR w="12700" cap="flat" cmpd="sng" algn="ctr">
+                      <a:solidFill>
+                        <a:schemeClr val="bg1">
+                          <a:lumMod val="50000"/>
+                        </a:schemeClr>
+                      </a:solidFill>
+                      <a:prstDash val="solid"/>
+                      <a:round/>
+                      <a:headEnd type="none" w="med" len="med"/>
+                      <a:tailEnd type="none" w="med" len="med"/>
+                    </a:lnR>
+                    <a:lnT w="12700" cap="flat" cmpd="sng" algn="ctr">
+                      <a:solidFill>
+                        <a:schemeClr val="bg1">
+                          <a:lumMod val="50000"/>
+                        </a:schemeClr>
+                      </a:solidFill>
+                      <a:prstDash val="solid"/>
+                      <a:round/>
+                      <a:headEnd type="none" w="med" len="med"/>
+                      <a:tailEnd type="none" w="med" len="med"/>
+                    </a:lnT>
+                    <a:lnB w="12700" cap="flat" cmpd="sng" algn="ctr">
+                      <a:solidFill>
+                        <a:schemeClr val="bg1">
+                          <a:lumMod val="50000"/>
+                        </a:schemeClr>
+                      </a:solidFill>
+                      <a:prstDash val="solid"/>
+                      <a:round/>
+                      <a:headEnd type="none" w="med" len="med"/>
+                      <a:tailEnd type="none" w="med" len="med"/>
+                    </a:lnB>
+                    <a:lnTlToBr w="12700" cmpd="sng">
+                      <a:noFill/>
+                      <a:prstDash val="solid"/>
+                    </a:lnTlToBr>
+                    <a:lnBlToTr w="12700" cmpd="sng">
+                      <a:noFill/>
+                      <a:prstDash val="solid"/>
+                    </a:lnBlToTr>
+                    <a:solidFill>
+                      <a:schemeClr val="bg1"/>
+                    </a:solidFill>
+                  </a:tcPr>
+                </a:tc>
+                <a:extLst>
+                  <a:ext uri="{0D108BD9-81ED-4DB2-BD59-A6C34878D82A}">
+                    <a16:rowId xmlns:a16="http://schemas.microsoft.com/office/drawing/2014/main" val="923224526"/>
+                  </a:ext>
+                </a:extLst>
+              </a:tr>
+            </a:tbl>
+          </a:graphicData>
+        </a:graphic>
+      </p:graphicFrame>
+      <p:graphicFrame>
+        <p:nvGraphicFramePr>
+          <p:cNvPr id="75" name="Table 4">
+            <a:extLst>
+              <a:ext uri="{FF2B5EF4-FFF2-40B4-BE49-F238E27FC236}">
+                <a16:creationId xmlns:a16="http://schemas.microsoft.com/office/drawing/2014/main" id="{1A03161F-84F2-8532-8E4D-BBF9CBFD88CB}"/>
+              </a:ext>
+            </a:extLst>
+          </p:cNvPr>
+          <p:cNvGraphicFramePr>
+            <a:graphicFrameLocks noGrp="1"/>
+          </p:cNvGraphicFramePr>
+          <p:nvPr>
+            <p:extLst>
+              <p:ext uri="{D42A27DB-BD31-4B8C-83A1-F6EECF244321}">
+                <p14:modId xmlns:p14="http://schemas.microsoft.com/office/powerpoint/2010/main" val="2700418292"/>
+              </p:ext>
+            </p:extLst>
+          </p:nvPr>
+        </p:nvGraphicFramePr>
+        <p:xfrm>
+          <a:off x="5177540" y="4386406"/>
+          <a:ext cx="652183" cy="370840"/>
+        </p:xfrm>
+        <a:graphic>
+          <a:graphicData uri="http://schemas.openxmlformats.org/drawingml/2006/table">
+            <a:tbl>
+              <a:tblPr firstRow="1" bandRow="1">
+                <a:tableStyleId>{5C22544A-7EE6-4342-B048-85BDC9FD1C3A}</a:tableStyleId>
+              </a:tblPr>
+              <a:tblGrid>
+                <a:gridCol w="652183">
+                  <a:extLst>
+                    <a:ext uri="{9D8B030D-6E8A-4147-A177-3AD203B41FA5}">
+                      <a16:colId xmlns:a16="http://schemas.microsoft.com/office/drawing/2014/main" val="596418570"/>
+                    </a:ext>
+                  </a:extLst>
+                </a:gridCol>
+              </a:tblGrid>
+              <a:tr h="370840">
+                <a:tc>
+                  <a:txBody>
+                    <a:bodyPr/>
+                    <a:lstStyle/>
+                    <a:p>
+                      <a:pPr algn="ctr"/>
+                      <a:r>
+                        <a:rPr lang="en-US" b="0" dirty="0">
+                          <a:solidFill>
+                            <a:schemeClr val="bg1">
+                              <a:lumMod val="50000"/>
+                            </a:schemeClr>
+                          </a:solidFill>
+                        </a:rPr>
+                        <a:t>3.1</a:t>
+                      </a:r>
+                    </a:p>
+                  </a:txBody>
+                  <a:tcPr anchor="ctr">
+                    <a:lnL w="12700" cap="flat" cmpd="sng" algn="ctr">
+                      <a:solidFill>
+                        <a:schemeClr val="bg1">
+                          <a:lumMod val="50000"/>
+                        </a:schemeClr>
+                      </a:solidFill>
+                      <a:prstDash val="solid"/>
+                      <a:round/>
+                      <a:headEnd type="none" w="med" len="med"/>
+                      <a:tailEnd type="none" w="med" len="med"/>
+                    </a:lnL>
+                    <a:lnR w="12700" cap="flat" cmpd="sng" algn="ctr">
+                      <a:solidFill>
+                        <a:schemeClr val="bg1">
+                          <a:lumMod val="50000"/>
+                        </a:schemeClr>
+                      </a:solidFill>
+                      <a:prstDash val="solid"/>
+                      <a:round/>
+                      <a:headEnd type="none" w="med" len="med"/>
+                      <a:tailEnd type="none" w="med" len="med"/>
+                    </a:lnR>
+                    <a:lnT w="12700" cap="flat" cmpd="sng" algn="ctr">
+                      <a:solidFill>
+                        <a:schemeClr val="bg1">
+                          <a:lumMod val="50000"/>
+                        </a:schemeClr>
+                      </a:solidFill>
+                      <a:prstDash val="solid"/>
+                      <a:round/>
+                      <a:headEnd type="none" w="med" len="med"/>
+                      <a:tailEnd type="none" w="med" len="med"/>
+                    </a:lnT>
+                    <a:lnB w="12700" cap="flat" cmpd="sng" algn="ctr">
+                      <a:solidFill>
+                        <a:schemeClr val="bg1">
+                          <a:lumMod val="50000"/>
+                        </a:schemeClr>
+                      </a:solidFill>
+                      <a:prstDash val="solid"/>
+                      <a:round/>
+                      <a:headEnd type="none" w="med" len="med"/>
+                      <a:tailEnd type="none" w="med" len="med"/>
+                    </a:lnB>
+                    <a:lnTlToBr w="12700" cmpd="sng">
+                      <a:noFill/>
+                      <a:prstDash val="solid"/>
+                    </a:lnTlToBr>
+                    <a:lnBlToTr w="12700" cmpd="sng">
+                      <a:noFill/>
+                      <a:prstDash val="solid"/>
+                    </a:lnBlToTr>
+                    <a:solidFill>
+                      <a:schemeClr val="bg1"/>
+                    </a:solidFill>
+                  </a:tcPr>
+                </a:tc>
+                <a:extLst>
+                  <a:ext uri="{0D108BD9-81ED-4DB2-BD59-A6C34878D82A}">
+                    <a16:rowId xmlns:a16="http://schemas.microsoft.com/office/drawing/2014/main" val="923224526"/>
+                  </a:ext>
+                </a:extLst>
+              </a:tr>
+            </a:tbl>
+          </a:graphicData>
+        </a:graphic>
+      </p:graphicFrame>
+    </p:spTree>
+    <p:extLst>
+      <p:ext uri="{BB962C8B-B14F-4D97-AF65-F5344CB8AC3E}">
+        <p14:creationId xmlns:p14="http://schemas.microsoft.com/office/powerpoint/2010/main" val="2494156093"/>
+      </p:ext>
+    </p:extLst>
+  </p:cSld>
+  <p:clrMapOvr>
+    <a:masterClrMapping/>
+  </p:clrMapOvr>
+  <p:timing>
+    <p:tnLst>
+      <p:par>
+        <p:cTn id="1" dur="indefinite" restart="never" nodeType="tmRoot">
+          <p:childTnLst>
+            <p:seq concurrent="1" nextAc="seek">
+              <p:cTn id="2" dur="indefinite" nodeType="mainSeq">
+                <p:childTnLst>
+                  <p:par>
+                    <p:cTn id="3" fill="hold">
+                      <p:stCondLst>
+                        <p:cond delay="indefinite"/>
+                      </p:stCondLst>
+                      <p:childTnLst>
+                        <p:par>
+                          <p:cTn id="4" fill="hold">
+                            <p:stCondLst>
+                              <p:cond delay="0"/>
+                            </p:stCondLst>
+                            <p:childTnLst>
+                              <p:par>
+                                <p:cTn id="5" presetID="10" presetClass="entr" presetSubtype="0" fill="hold" nodeType="clickEffect">
+                                  <p:stCondLst>
+                                    <p:cond delay="0"/>
+                                  </p:stCondLst>
+                                  <p:childTnLst>
+                                    <p:set>
+                                      <p:cBhvr>
+                                        <p:cTn id="6" dur="1" fill="hold">
+                                          <p:stCondLst>
+                                            <p:cond delay="0"/>
+                                          </p:stCondLst>
+                                        </p:cTn>
+                                        <p:tgtEl>
+                                          <p:spTgt spid="8"/>
+                                        </p:tgtEl>
+                                        <p:attrNameLst>
+                                          <p:attrName>style.visibility</p:attrName>
+                                        </p:attrNameLst>
+                                      </p:cBhvr>
+                                      <p:to>
+                                        <p:strVal val="visible"/>
+                                      </p:to>
+                                    </p:set>
+                                    <p:animEffect transition="in" filter="fade">
+                                      <p:cBhvr>
+                                        <p:cTn id="7" dur="200"/>
+                                        <p:tgtEl>
+                                          <p:spTgt spid="8"/>
+                                        </p:tgtEl>
+                                      </p:cBhvr>
+                                    </p:animEffect>
+                                  </p:childTnLst>
+                                </p:cTn>
+                              </p:par>
+                            </p:childTnLst>
+                          </p:cTn>
+                        </p:par>
+                        <p:par>
+                          <p:cTn id="8" fill="hold">
+                            <p:stCondLst>
+                              <p:cond delay="200"/>
+                            </p:stCondLst>
+                            <p:childTnLst>
+                              <p:par>
+                                <p:cTn id="9" presetID="10" presetClass="entr" presetSubtype="0" fill="hold" nodeType="afterEffect">
+                                  <p:stCondLst>
+                                    <p:cond delay="0"/>
+                                  </p:stCondLst>
+                                  <p:childTnLst>
+                                    <p:set>
+                                      <p:cBhvr>
+                                        <p:cTn id="10" dur="1" fill="hold">
+                                          <p:stCondLst>
+                                            <p:cond delay="0"/>
+                                          </p:stCondLst>
+                                        </p:cTn>
+                                        <p:tgtEl>
+                                          <p:spTgt spid="16"/>
+                                        </p:tgtEl>
+                                        <p:attrNameLst>
+                                          <p:attrName>style.visibility</p:attrName>
+                                        </p:attrNameLst>
+                                      </p:cBhvr>
+                                      <p:to>
+                                        <p:strVal val="visible"/>
+                                      </p:to>
+                                    </p:set>
+                                    <p:animEffect transition="in" filter="fade">
+                                      <p:cBhvr>
+                                        <p:cTn id="11" dur="200"/>
+                                        <p:tgtEl>
+                                          <p:spTgt spid="16"/>
+                                        </p:tgtEl>
+                                      </p:cBhvr>
+                                    </p:animEffect>
+                                  </p:childTnLst>
+                                </p:cTn>
+                              </p:par>
+                            </p:childTnLst>
+                          </p:cTn>
+                        </p:par>
+                        <p:par>
+                          <p:cTn id="12" fill="hold">
+                            <p:stCondLst>
+                              <p:cond delay="400"/>
+                            </p:stCondLst>
+                            <p:childTnLst>
+                              <p:par>
+                                <p:cTn id="13" presetID="10" presetClass="entr" presetSubtype="0" fill="hold" nodeType="afterEffect">
+                                  <p:stCondLst>
+                                    <p:cond delay="0"/>
+                                  </p:stCondLst>
+                                  <p:childTnLst>
+                                    <p:set>
+                                      <p:cBhvr>
+                                        <p:cTn id="14" dur="1" fill="hold">
+                                          <p:stCondLst>
+                                            <p:cond delay="0"/>
+                                          </p:stCondLst>
+                                        </p:cTn>
+                                        <p:tgtEl>
+                                          <p:spTgt spid="19"/>
+                                        </p:tgtEl>
+                                        <p:attrNameLst>
+                                          <p:attrName>style.visibility</p:attrName>
+                                        </p:attrNameLst>
+                                      </p:cBhvr>
+                                      <p:to>
+                                        <p:strVal val="visible"/>
+                                      </p:to>
+                                    </p:set>
+                                    <p:animEffect transition="in" filter="fade">
+                                      <p:cBhvr>
+                                        <p:cTn id="15" dur="200"/>
+                                        <p:tgtEl>
+                                          <p:spTgt spid="19"/>
+                                        </p:tgtEl>
+                                      </p:cBhvr>
+                                    </p:animEffect>
+                                  </p:childTnLst>
+                                </p:cTn>
+                              </p:par>
+                            </p:childTnLst>
+                          </p:cTn>
+                        </p:par>
+                        <p:par>
+                          <p:cTn id="16" fill="hold">
+                            <p:stCondLst>
+                              <p:cond delay="600"/>
+                            </p:stCondLst>
+                            <p:childTnLst>
+                              <p:par>
+                                <p:cTn id="17" presetID="10" presetClass="entr" presetSubtype="0" fill="hold" nodeType="afterEffect">
+                                  <p:stCondLst>
+                                    <p:cond delay="0"/>
+                                  </p:stCondLst>
+                                  <p:childTnLst>
+                                    <p:set>
+                                      <p:cBhvr>
+                                        <p:cTn id="18" dur="1" fill="hold">
+                                          <p:stCondLst>
+                                            <p:cond delay="0"/>
+                                          </p:stCondLst>
+                                        </p:cTn>
+                                        <p:tgtEl>
+                                          <p:spTgt spid="21"/>
+                                        </p:tgtEl>
+                                        <p:attrNameLst>
+                                          <p:attrName>style.visibility</p:attrName>
+                                        </p:attrNameLst>
+                                      </p:cBhvr>
+                                      <p:to>
+                                        <p:strVal val="visible"/>
+                                      </p:to>
+                                    </p:set>
+                                    <p:animEffect transition="in" filter="fade">
+                                      <p:cBhvr>
+                                        <p:cTn id="19" dur="200"/>
+                                        <p:tgtEl>
+                                          <p:spTgt spid="21"/>
+                                        </p:tgtEl>
+                                      </p:cBhvr>
+                                    </p:animEffect>
+                                  </p:childTnLst>
+                                </p:cTn>
+                              </p:par>
+                            </p:childTnLst>
+                          </p:cTn>
+                        </p:par>
+                        <p:par>
+                          <p:cTn id="20" fill="hold">
+                            <p:stCondLst>
+                              <p:cond delay="800"/>
+                            </p:stCondLst>
+                            <p:childTnLst>
+                              <p:par>
+                                <p:cTn id="21" presetID="10" presetClass="entr" presetSubtype="0" fill="hold" nodeType="afterEffect">
+                                  <p:stCondLst>
+                                    <p:cond delay="0"/>
+                                  </p:stCondLst>
+                                  <p:childTnLst>
+                                    <p:set>
+                                      <p:cBhvr>
+                                        <p:cTn id="22" dur="1" fill="hold">
+                                          <p:stCondLst>
+                                            <p:cond delay="0"/>
+                                          </p:stCondLst>
+                                        </p:cTn>
+                                        <p:tgtEl>
+                                          <p:spTgt spid="32"/>
+                                        </p:tgtEl>
+                                        <p:attrNameLst>
+                                          <p:attrName>style.visibility</p:attrName>
+                                        </p:attrNameLst>
+                                      </p:cBhvr>
+                                      <p:to>
+                                        <p:strVal val="visible"/>
+                                      </p:to>
+                                    </p:set>
+                                    <p:animEffect transition="in" filter="fade">
+                                      <p:cBhvr>
+                                        <p:cTn id="23" dur="200"/>
+                                        <p:tgtEl>
+                                          <p:spTgt spid="32"/>
+                                        </p:tgtEl>
+                                      </p:cBhvr>
+                                    </p:animEffect>
+                                  </p:childTnLst>
+                                </p:cTn>
+                              </p:par>
+                            </p:childTnLst>
+                          </p:cTn>
+                        </p:par>
+                      </p:childTnLst>
+                    </p:cTn>
+                  </p:par>
+                  <p:par>
+                    <p:cTn id="24" fill="hold">
+                      <p:stCondLst>
+                        <p:cond delay="indefinite"/>
+                      </p:stCondLst>
+                      <p:childTnLst>
+                        <p:par>
+                          <p:cTn id="25" fill="hold">
+                            <p:stCondLst>
+                              <p:cond delay="0"/>
+                            </p:stCondLst>
+                            <p:childTnLst>
+                              <p:par>
+                                <p:cTn id="26" presetID="10" presetClass="entr" presetSubtype="0" fill="hold" nodeType="clickEffect">
+                                  <p:stCondLst>
+                                    <p:cond delay="0"/>
+                                  </p:stCondLst>
+                                  <p:childTnLst>
+                                    <p:set>
+                                      <p:cBhvr>
+                                        <p:cTn id="27" dur="1" fill="hold">
+                                          <p:stCondLst>
+                                            <p:cond delay="0"/>
+                                          </p:stCondLst>
+                                        </p:cTn>
+                                        <p:tgtEl>
+                                          <p:spTgt spid="71"/>
+                                        </p:tgtEl>
+                                        <p:attrNameLst>
+                                          <p:attrName>style.visibility</p:attrName>
+                                        </p:attrNameLst>
+                                      </p:cBhvr>
+                                      <p:to>
+                                        <p:strVal val="visible"/>
+                                      </p:to>
+                                    </p:set>
+                                    <p:animEffect transition="in" filter="fade">
+                                      <p:cBhvr>
+                                        <p:cTn id="28" dur="250"/>
+                                        <p:tgtEl>
+                                          <p:spTgt spid="71"/>
+                                        </p:tgtEl>
+                                      </p:cBhvr>
+                                    </p:animEffect>
+                                  </p:childTnLst>
+                                </p:cTn>
+                              </p:par>
+                            </p:childTnLst>
+                          </p:cTn>
+                        </p:par>
+                        <p:par>
+                          <p:cTn id="29" fill="hold">
+                            <p:stCondLst>
+                              <p:cond delay="250"/>
+                            </p:stCondLst>
+                            <p:childTnLst>
+                              <p:par>
+                                <p:cTn id="30" presetID="10" presetClass="entr" presetSubtype="0" fill="hold" nodeType="afterEffect">
+                                  <p:stCondLst>
+                                    <p:cond delay="0"/>
+                                  </p:stCondLst>
+                                  <p:childTnLst>
+                                    <p:set>
+                                      <p:cBhvr>
+                                        <p:cTn id="31" dur="1" fill="hold">
+                                          <p:stCondLst>
+                                            <p:cond delay="0"/>
+                                          </p:stCondLst>
+                                        </p:cTn>
+                                        <p:tgtEl>
+                                          <p:spTgt spid="73"/>
+                                        </p:tgtEl>
+                                        <p:attrNameLst>
+                                          <p:attrName>style.visibility</p:attrName>
+                                        </p:attrNameLst>
+                                      </p:cBhvr>
+                                      <p:to>
+                                        <p:strVal val="visible"/>
+                                      </p:to>
+                                    </p:set>
+                                    <p:animEffect transition="in" filter="fade">
+                                      <p:cBhvr>
+                                        <p:cTn id="32" dur="250"/>
+                                        <p:tgtEl>
+                                          <p:spTgt spid="73"/>
+                                        </p:tgtEl>
+                                      </p:cBhvr>
+                                    </p:animEffect>
+                                  </p:childTnLst>
+                                </p:cTn>
+                              </p:par>
+                            </p:childTnLst>
+                          </p:cTn>
+                        </p:par>
+                        <p:par>
+                          <p:cTn id="33" fill="hold">
+                            <p:stCondLst>
+                              <p:cond delay="500"/>
+                            </p:stCondLst>
+                            <p:childTnLst>
+                              <p:par>
+                                <p:cTn id="34" presetID="10" presetClass="entr" presetSubtype="0" fill="hold" nodeType="afterEffect">
+                                  <p:stCondLst>
+                                    <p:cond delay="0"/>
+                                  </p:stCondLst>
+                                  <p:childTnLst>
+                                    <p:set>
+                                      <p:cBhvr>
+                                        <p:cTn id="35" dur="1" fill="hold">
+                                          <p:stCondLst>
+                                            <p:cond delay="0"/>
+                                          </p:stCondLst>
+                                        </p:cTn>
+                                        <p:tgtEl>
+                                          <p:spTgt spid="72"/>
+                                        </p:tgtEl>
+                                        <p:attrNameLst>
+                                          <p:attrName>style.visibility</p:attrName>
+                                        </p:attrNameLst>
+                                      </p:cBhvr>
+                                      <p:to>
+                                        <p:strVal val="visible"/>
+                                      </p:to>
+                                    </p:set>
+                                    <p:animEffect transition="in" filter="fade">
+                                      <p:cBhvr>
+                                        <p:cTn id="36" dur="250"/>
+                                        <p:tgtEl>
+                                          <p:spTgt spid="72"/>
+                                        </p:tgtEl>
+                                      </p:cBhvr>
+                                    </p:animEffect>
+                                  </p:childTnLst>
+                                </p:cTn>
+                              </p:par>
+                            </p:childTnLst>
+                          </p:cTn>
+                        </p:par>
+                        <p:par>
+                          <p:cTn id="37" fill="hold">
+                            <p:stCondLst>
+                              <p:cond delay="750"/>
+                            </p:stCondLst>
+                            <p:childTnLst>
+                              <p:par>
+                                <p:cTn id="38" presetID="10" presetClass="entr" presetSubtype="0" fill="hold" nodeType="afterEffect">
+                                  <p:stCondLst>
+                                    <p:cond delay="0"/>
+                                  </p:stCondLst>
+                                  <p:childTnLst>
+                                    <p:set>
+                                      <p:cBhvr>
+                                        <p:cTn id="39" dur="1" fill="hold">
+                                          <p:stCondLst>
+                                            <p:cond delay="0"/>
+                                          </p:stCondLst>
+                                        </p:cTn>
+                                        <p:tgtEl>
+                                          <p:spTgt spid="74"/>
+                                        </p:tgtEl>
+                                        <p:attrNameLst>
+                                          <p:attrName>style.visibility</p:attrName>
+                                        </p:attrNameLst>
+                                      </p:cBhvr>
+                                      <p:to>
+                                        <p:strVal val="visible"/>
+                                      </p:to>
+                                    </p:set>
+                                    <p:animEffect transition="in" filter="fade">
+                                      <p:cBhvr>
+                                        <p:cTn id="40" dur="250"/>
+                                        <p:tgtEl>
+                                          <p:spTgt spid="74"/>
+                                        </p:tgtEl>
+                                      </p:cBhvr>
+                                    </p:animEffect>
+                                  </p:childTnLst>
+                                </p:cTn>
+                              </p:par>
+                            </p:childTnLst>
+                          </p:cTn>
+                        </p:par>
+                        <p:par>
+                          <p:cTn id="41" fill="hold">
+                            <p:stCondLst>
+                              <p:cond delay="1000"/>
+                            </p:stCondLst>
+                            <p:childTnLst>
+                              <p:par>
+                                <p:cTn id="42" presetID="10" presetClass="entr" presetSubtype="0" fill="hold" nodeType="afterEffect">
+                                  <p:stCondLst>
+                                    <p:cond delay="0"/>
+                                  </p:stCondLst>
+                                  <p:childTnLst>
+                                    <p:set>
+                                      <p:cBhvr>
+                                        <p:cTn id="43" dur="1" fill="hold">
+                                          <p:stCondLst>
+                                            <p:cond delay="0"/>
+                                          </p:stCondLst>
+                                        </p:cTn>
+                                        <p:tgtEl>
+                                          <p:spTgt spid="75"/>
+                                        </p:tgtEl>
+                                        <p:attrNameLst>
+                                          <p:attrName>style.visibility</p:attrName>
+                                        </p:attrNameLst>
+                                      </p:cBhvr>
+                                      <p:to>
+                                        <p:strVal val="visible"/>
+                                      </p:to>
+                                    </p:set>
+                                    <p:animEffect transition="in" filter="fade">
+                                      <p:cBhvr>
+                                        <p:cTn id="44" dur="250"/>
+                                        <p:tgtEl>
+                                          <p:spTgt spid="75"/>
+                                        </p:tgtEl>
+                                      </p:cBhvr>
+                                    </p:animEffect>
+                                  </p:childTnLst>
+                                </p:cTn>
+                              </p:par>
+                            </p:childTnLst>
+                          </p:cTn>
+                        </p:par>
+                      </p:childTnLst>
+                    </p:cTn>
+                  </p:par>
+                </p:childTnLst>
+              </p:cTn>
+              <p:prevCondLst>
+                <p:cond evt="onPrev" delay="0">
+                  <p:tgtEl>
+                    <p:sldTgt/>
+                  </p:tgtEl>
+                </p:cond>
+              </p:prevCondLst>
+              <p:nextCondLst>
+                <p:cond evt="onNext" delay="0">
+                  <p:tgtEl>
+                    <p:sldTgt/>
+                  </p:tgtEl>
+                </p:cond>
+              </p:nextCondLst>
+            </p:seq>
+          </p:childTnLst>
+        </p:cTn>
+      </p:par>
+    </p:tnLst>
+  </p:timing>
+</p:sld>
+</file>
+
+<file path=ppt/slides/slide4.xml><?xml version="1.0" encoding="utf-8"?>
+<p:sld xmlns:a="http://schemas.openxmlformats.org/drawingml/2006/main" xmlns:r="http://schemas.openxmlformats.org/officeDocument/2006/relationships" xmlns:p="http://schemas.openxmlformats.org/presentationml/2006/main">
+  <p:cSld>
+    <p:spTree>
+      <p:nvGrpSpPr>
+        <p:cNvPr id="1" name=""/>
+        <p:cNvGrpSpPr/>
+        <p:nvPr/>
+      </p:nvGrpSpPr>
+      <p:grpSpPr>
+        <a:xfrm>
+          <a:off x="0" y="0"/>
+          <a:ext cx="0" cy="0"/>
+          <a:chOff x="0" y="0"/>
+          <a:chExt cx="0" cy="0"/>
+        </a:xfrm>
+      </p:grpSpPr>
+      <p:sp>
+        <p:nvSpPr>
+          <p:cNvPr id="2" name="Title 1">
+            <a:extLst>
+              <a:ext uri="{FF2B5EF4-FFF2-40B4-BE49-F238E27FC236}">
                 <a16:creationId xmlns:a16="http://schemas.microsoft.com/office/drawing/2014/main" id="{1D01E8D4-6E5D-3D0C-38C0-82F225028D39}"/>
               </a:ext>
             </a:extLst>
@@ -33473,7 +36193,7 @@
 </p:sld>
 </file>
 
-<file path=ppt/slides/slide4.xml><?xml version="1.0" encoding="utf-8"?>
+<file path=ppt/slides/slide5.xml><?xml version="1.0" encoding="utf-8"?>
 <p:sld xmlns:a="http://schemas.openxmlformats.org/drawingml/2006/main" xmlns:r="http://schemas.openxmlformats.org/officeDocument/2006/relationships" xmlns:p="http://schemas.openxmlformats.org/presentationml/2006/main">
   <p:cSld>
     <p:spTree>
@@ -36954,7 +39674,7 @@
 </p:sld>
 </file>
 
-<file path=ppt/slides/slide5.xml><?xml version="1.0" encoding="utf-8"?>
+<file path=ppt/slides/slide6.xml><?xml version="1.0" encoding="utf-8"?>
 <p:sld xmlns:a="http://schemas.openxmlformats.org/drawingml/2006/main" xmlns:r="http://schemas.openxmlformats.org/officeDocument/2006/relationships" xmlns:p="http://schemas.openxmlformats.org/presentationml/2006/main">
   <p:cSld>
     <p:spTree>
@@ -39852,7 +42572,7 @@
 </p:sld>
 </file>
 
-<file path=ppt/slides/slide6.xml><?xml version="1.0" encoding="utf-8"?>
+<file path=ppt/slides/slide7.xml><?xml version="1.0" encoding="utf-8"?>
 <p:sld xmlns:a="http://schemas.openxmlformats.org/drawingml/2006/main" xmlns:r="http://schemas.openxmlformats.org/officeDocument/2006/relationships" xmlns:p="http://schemas.openxmlformats.org/presentationml/2006/main">
   <p:cSld>
     <p:spTree>
@@ -45698,7 +48418,7 @@
 </p:sld>
 </file>
 
-<file path=ppt/slides/slide7.xml><?xml version="1.0" encoding="utf-8"?>
+<file path=ppt/slides/slide8.xml><?xml version="1.0" encoding="utf-8"?>
 <p:sld xmlns:a="http://schemas.openxmlformats.org/drawingml/2006/main" xmlns:r="http://schemas.openxmlformats.org/officeDocument/2006/relationships" xmlns:p="http://schemas.openxmlformats.org/presentationml/2006/main">
   <p:cSld>
     <p:spTree>
@@ -50380,7 +53100,7 @@
 </p:sld>
 </file>
 
-<file path=ppt/slides/slide8.xml><?xml version="1.0" encoding="utf-8"?>
+<file path=ppt/slides/slide9.xml><?xml version="1.0" encoding="utf-8"?>
 <p:sld xmlns:a="http://schemas.openxmlformats.org/drawingml/2006/main" xmlns:r="http://schemas.openxmlformats.org/officeDocument/2006/relationships" xmlns:p="http://schemas.openxmlformats.org/presentationml/2006/main">
   <p:cSld>
     <p:spTree>
@@ -50466,145 +53186,6 @@
     <p:extLst>
       <p:ext uri="{BB962C8B-B14F-4D97-AF65-F5344CB8AC3E}">
         <p14:creationId xmlns:p14="http://schemas.microsoft.com/office/powerpoint/2010/main" val="193138708"/>
-      </p:ext>
-    </p:extLst>
-  </p:cSld>
-  <p:clrMapOvr>
-    <a:masterClrMapping/>
-  </p:clrMapOvr>
-</p:sld>
-</file>
-
-<file path=ppt/slides/slide9.xml><?xml version="1.0" encoding="utf-8"?>
-<p:sld xmlns:a="http://schemas.openxmlformats.org/drawingml/2006/main" xmlns:r="http://schemas.openxmlformats.org/officeDocument/2006/relationships" xmlns:p="http://schemas.openxmlformats.org/presentationml/2006/main">
-  <p:cSld>
-    <p:spTree>
-      <p:nvGrpSpPr>
-        <p:cNvPr id="1" name=""/>
-        <p:cNvGrpSpPr/>
-        <p:nvPr/>
-      </p:nvGrpSpPr>
-      <p:grpSpPr>
-        <a:xfrm>
-          <a:off x="0" y="0"/>
-          <a:ext cx="0" cy="0"/>
-          <a:chOff x="0" y="0"/>
-          <a:chExt cx="0" cy="0"/>
-        </a:xfrm>
-      </p:grpSpPr>
-      <p:sp>
-        <p:nvSpPr>
-          <p:cNvPr id="2" name="Title 1">
-            <a:extLst>
-              <a:ext uri="{FF2B5EF4-FFF2-40B4-BE49-F238E27FC236}">
-                <a16:creationId xmlns:a16="http://schemas.microsoft.com/office/drawing/2014/main" id="{432463C0-896B-E77C-2116-758273F29618}"/>
-              </a:ext>
-            </a:extLst>
-          </p:cNvPr>
-          <p:cNvSpPr>
-            <a:spLocks noGrp="1"/>
-          </p:cNvSpPr>
-          <p:nvPr>
-            <p:ph type="title"/>
-          </p:nvPr>
-        </p:nvSpPr>
-        <p:spPr/>
-        <p:txBody>
-          <a:bodyPr/>
-          <a:lstStyle/>
-          <a:p>
-            <a:r>
-              <a:rPr lang="en-US" dirty="0"/>
-              <a:t>Training steps</a:t>
-            </a:r>
-          </a:p>
-        </p:txBody>
-      </p:sp>
-      <p:sp>
-        <p:nvSpPr>
-          <p:cNvPr id="3" name="Content Placeholder 2">
-            <a:extLst>
-              <a:ext uri="{FF2B5EF4-FFF2-40B4-BE49-F238E27FC236}">
-                <a16:creationId xmlns:a16="http://schemas.microsoft.com/office/drawing/2014/main" id="{3AA2B7AF-1482-D472-560D-874EBAC1FC3D}"/>
-              </a:ext>
-            </a:extLst>
-          </p:cNvPr>
-          <p:cNvSpPr>
-            <a:spLocks noGrp="1"/>
-          </p:cNvSpPr>
-          <p:nvPr>
-            <p:ph idx="1"/>
-          </p:nvPr>
-        </p:nvSpPr>
-        <p:spPr/>
-        <p:txBody>
-          <a:bodyPr>
-            <a:normAutofit/>
-          </a:bodyPr>
-          <a:lstStyle/>
-          <a:p>
-            <a:pPr marL="514350" indent="-514350">
-              <a:buFont typeface="+mj-lt"/>
-              <a:buAutoNum type="arabicPeriod"/>
-            </a:pPr>
-            <a:endParaRPr lang="en-US" dirty="0"/>
-          </a:p>
-          <a:p>
-            <a:pPr marL="514350" indent="-514350">
-              <a:buFont typeface="+mj-lt"/>
-              <a:buAutoNum type="arabicPeriod"/>
-            </a:pPr>
-            <a:r>
-              <a:rPr lang="en-US" dirty="0"/>
-              <a:t>Create a network with random weights</a:t>
-            </a:r>
-          </a:p>
-          <a:p>
-            <a:pPr marL="514350" indent="-514350">
-              <a:buFont typeface="+mj-lt"/>
-              <a:buAutoNum type="arabicPeriod"/>
-            </a:pPr>
-            <a:r>
-              <a:rPr lang="en-US" dirty="0"/>
-              <a:t>Feed one piece of data (for which you know the desired output)</a:t>
-            </a:r>
-          </a:p>
-          <a:p>
-            <a:pPr marL="514350" indent="-514350">
-              <a:buFont typeface="+mj-lt"/>
-              <a:buAutoNum type="arabicPeriod"/>
-            </a:pPr>
-            <a:r>
-              <a:rPr lang="en-US" dirty="0"/>
-              <a:t>Calculate the error</a:t>
-            </a:r>
-          </a:p>
-          <a:p>
-            <a:pPr marL="514350" indent="-514350">
-              <a:buFont typeface="+mj-lt"/>
-              <a:buAutoNum type="arabicPeriod"/>
-            </a:pPr>
-            <a:r>
-              <a:rPr lang="en-US" dirty="0"/>
-              <a:t>Backpropagate the error to all intermediate variables</a:t>
-            </a:r>
-          </a:p>
-          <a:p>
-            <a:pPr marL="514350" indent="-514350">
-              <a:buFont typeface="+mj-lt"/>
-              <a:buAutoNum type="arabicPeriod"/>
-            </a:pPr>
-            <a:r>
-              <a:rPr lang="en-US" dirty="0"/>
-              <a:t>Update the parameters</a:t>
-            </a:r>
-          </a:p>
-        </p:txBody>
-      </p:sp>
-    </p:spTree>
-    <p:extLst>
-      <p:ext uri="{BB962C8B-B14F-4D97-AF65-F5344CB8AC3E}">
-        <p14:creationId xmlns:p14="http://schemas.microsoft.com/office/powerpoint/2010/main" val="356368320"/>
       </p:ext>
     </p:extLst>
   </p:cSld>

</xml_diff>